<commit_message>
[Publication Review] Predicting drug target using semantic...
</commit_message>
<xml_diff>
--- a/Review/BMCBioinfo_2016_Fu_predicting drug target using sementic network/Predicting drug target interactions using meta-path-based semantic network.pptx
+++ b/Review/BMCBioinfo_2016_Fu_predicting drug target using sementic network/Predicting drug target interactions using meta-path-based semantic network.pptx
@@ -6,6 +6,26 @@
   </p:sldMasterIdLst>
   <p:sldIdLst>
     <p:sldId id="256" r:id="rId2"/>
+    <p:sldId id="257" r:id="rId3"/>
+    <p:sldId id="258" r:id="rId4"/>
+    <p:sldId id="259" r:id="rId5"/>
+    <p:sldId id="261" r:id="rId6"/>
+    <p:sldId id="262" r:id="rId7"/>
+    <p:sldId id="264" r:id="rId8"/>
+    <p:sldId id="263" r:id="rId9"/>
+    <p:sldId id="266" r:id="rId10"/>
+    <p:sldId id="268" r:id="rId11"/>
+    <p:sldId id="267" r:id="rId12"/>
+    <p:sldId id="265" r:id="rId13"/>
+    <p:sldId id="269" r:id="rId14"/>
+    <p:sldId id="270" r:id="rId15"/>
+    <p:sldId id="271" r:id="rId16"/>
+    <p:sldId id="272" r:id="rId17"/>
+    <p:sldId id="273" r:id="rId18"/>
+    <p:sldId id="275" r:id="rId19"/>
+    <p:sldId id="276" r:id="rId20"/>
+    <p:sldId id="277" r:id="rId21"/>
+    <p:sldId id="278" r:id="rId22"/>
   </p:sldIdLst>
   <p:sldSz cx="12192000" cy="6858000"/>
   <p:notesSz cx="6858000" cy="9144000"/>
@@ -238,7 +258,7 @@
           <a:p>
             <a:fld id="{A3FF8443-6415-46BB-B6BC-6AADC3E28007}" type="datetimeFigureOut">
               <a:rPr lang="ko-KR" altLang="en-US" smtClean="0"/>
-              <a:t>2016-07-15</a:t>
+              <a:t>2016-07-17</a:t>
             </a:fld>
             <a:endParaRPr lang="ko-KR" altLang="en-US"/>
           </a:p>
@@ -408,7 +428,7 @@
           <a:p>
             <a:fld id="{A3FF8443-6415-46BB-B6BC-6AADC3E28007}" type="datetimeFigureOut">
               <a:rPr lang="ko-KR" altLang="en-US" smtClean="0"/>
-              <a:t>2016-07-15</a:t>
+              <a:t>2016-07-17</a:t>
             </a:fld>
             <a:endParaRPr lang="ko-KR" altLang="en-US"/>
           </a:p>
@@ -588,7 +608,7 @@
           <a:p>
             <a:fld id="{A3FF8443-6415-46BB-B6BC-6AADC3E28007}" type="datetimeFigureOut">
               <a:rPr lang="ko-KR" altLang="en-US" smtClean="0"/>
-              <a:t>2016-07-15</a:t>
+              <a:t>2016-07-17</a:t>
             </a:fld>
             <a:endParaRPr lang="ko-KR" altLang="en-US"/>
           </a:p>
@@ -758,7 +778,7 @@
           <a:p>
             <a:fld id="{A3FF8443-6415-46BB-B6BC-6AADC3E28007}" type="datetimeFigureOut">
               <a:rPr lang="ko-KR" altLang="en-US" smtClean="0"/>
-              <a:t>2016-07-15</a:t>
+              <a:t>2016-07-17</a:t>
             </a:fld>
             <a:endParaRPr lang="ko-KR" altLang="en-US"/>
           </a:p>
@@ -1004,7 +1024,7 @@
           <a:p>
             <a:fld id="{A3FF8443-6415-46BB-B6BC-6AADC3E28007}" type="datetimeFigureOut">
               <a:rPr lang="ko-KR" altLang="en-US" smtClean="0"/>
-              <a:t>2016-07-15</a:t>
+              <a:t>2016-07-17</a:t>
             </a:fld>
             <a:endParaRPr lang="ko-KR" altLang="en-US"/>
           </a:p>
@@ -1236,7 +1256,7 @@
           <a:p>
             <a:fld id="{A3FF8443-6415-46BB-B6BC-6AADC3E28007}" type="datetimeFigureOut">
               <a:rPr lang="ko-KR" altLang="en-US" smtClean="0"/>
-              <a:t>2016-07-15</a:t>
+              <a:t>2016-07-17</a:t>
             </a:fld>
             <a:endParaRPr lang="ko-KR" altLang="en-US"/>
           </a:p>
@@ -1603,7 +1623,7 @@
           <a:p>
             <a:fld id="{A3FF8443-6415-46BB-B6BC-6AADC3E28007}" type="datetimeFigureOut">
               <a:rPr lang="ko-KR" altLang="en-US" smtClean="0"/>
-              <a:t>2016-07-15</a:t>
+              <a:t>2016-07-17</a:t>
             </a:fld>
             <a:endParaRPr lang="ko-KR" altLang="en-US"/>
           </a:p>
@@ -1721,7 +1741,7 @@
           <a:p>
             <a:fld id="{A3FF8443-6415-46BB-B6BC-6AADC3E28007}" type="datetimeFigureOut">
               <a:rPr lang="ko-KR" altLang="en-US" smtClean="0"/>
-              <a:t>2016-07-15</a:t>
+              <a:t>2016-07-17</a:t>
             </a:fld>
             <a:endParaRPr lang="ko-KR" altLang="en-US"/>
           </a:p>
@@ -1816,7 +1836,7 @@
           <a:p>
             <a:fld id="{A3FF8443-6415-46BB-B6BC-6AADC3E28007}" type="datetimeFigureOut">
               <a:rPr lang="ko-KR" altLang="en-US" smtClean="0"/>
-              <a:t>2016-07-15</a:t>
+              <a:t>2016-07-17</a:t>
             </a:fld>
             <a:endParaRPr lang="ko-KR" altLang="en-US"/>
           </a:p>
@@ -2093,7 +2113,7 @@
           <a:p>
             <a:fld id="{A3FF8443-6415-46BB-B6BC-6AADC3E28007}" type="datetimeFigureOut">
               <a:rPr lang="ko-KR" altLang="en-US" smtClean="0"/>
-              <a:t>2016-07-15</a:t>
+              <a:t>2016-07-17</a:t>
             </a:fld>
             <a:endParaRPr lang="ko-KR" altLang="en-US"/>
           </a:p>
@@ -2346,7 +2366,7 @@
           <a:p>
             <a:fld id="{A3FF8443-6415-46BB-B6BC-6AADC3E28007}" type="datetimeFigureOut">
               <a:rPr lang="ko-KR" altLang="en-US" smtClean="0"/>
-              <a:t>2016-07-15</a:t>
+              <a:t>2016-07-17</a:t>
             </a:fld>
             <a:endParaRPr lang="ko-KR" altLang="en-US"/>
           </a:p>
@@ -2559,7 +2579,7 @@
           <a:p>
             <a:fld id="{A3FF8443-6415-46BB-B6BC-6AADC3E28007}" type="datetimeFigureOut">
               <a:rPr lang="ko-KR" altLang="en-US" smtClean="0"/>
-              <a:t>2016-07-15</a:t>
+              <a:t>2016-07-17</a:t>
             </a:fld>
             <a:endParaRPr lang="ko-KR" altLang="en-US"/>
           </a:p>
@@ -3014,10 +3034,47 @@
         </p:nvSpPr>
         <p:spPr/>
         <p:txBody>
-          <a:bodyPr/>
-          <a:lstStyle/>
-          <a:p>
-            <a:endParaRPr lang="ko-KR" altLang="en-US"/>
+          <a:bodyPr>
+            <a:normAutofit lnSpcReduction="10000"/>
+          </a:bodyPr>
+          <a:lstStyle/>
+          <a:p>
+            <a:pPr algn="r"/>
+            <a:r>
+              <a:rPr lang="en-US" altLang="ko-KR" dirty="0" smtClean="0"/>
+              <a:t>Gang Fu, Ying Ding, </a:t>
+            </a:r>
+            <a:r>
+              <a:rPr lang="en-US" altLang="ko-KR" dirty="0" err="1" smtClean="0"/>
+              <a:t>Abhik</a:t>
+            </a:r>
+            <a:r>
+              <a:rPr lang="en-US" altLang="ko-KR" dirty="0" smtClean="0"/>
+              <a:t> Seal, Bin Chen, </a:t>
+            </a:r>
+            <a:r>
+              <a:rPr lang="en-US" altLang="ko-KR" dirty="0" err="1" smtClean="0"/>
+              <a:t>Yizhou</a:t>
+            </a:r>
+            <a:r>
+              <a:rPr lang="en-US" altLang="ko-KR" dirty="0" smtClean="0"/>
+              <a:t> Sun and Evan Bolton</a:t>
+            </a:r>
+          </a:p>
+          <a:p>
+            <a:pPr algn="r"/>
+            <a:r>
+              <a:rPr lang="en-US" altLang="ko-KR" dirty="0" smtClean="0"/>
+              <a:t>BMC Bioinformatics</a:t>
+            </a:r>
+          </a:p>
+          <a:p>
+            <a:pPr algn="r"/>
+            <a:r>
+              <a:rPr lang="en-US" altLang="ko-KR" dirty="0" smtClean="0"/>
+              <a:t>2016</a:t>
+            </a:r>
+            <a:endParaRPr lang="ko-KR" altLang="en-US" dirty="0"/>
           </a:p>
         </p:txBody>
       </p:sp>
@@ -3031,6 +3088,3476 @@
   <p:clrMapOvr>
     <a:masterClrMapping/>
   </p:clrMapOvr>
+  <p:timing>
+    <p:tnLst>
+      <p:par>
+        <p:cTn id="1" dur="indefinite" restart="never" nodeType="tmRoot"/>
+      </p:par>
+    </p:tnLst>
+  </p:timing>
+</p:sld>
+</file>
+
+<file path=ppt/slides/slide10.xml><?xml version="1.0" encoding="utf-8"?>
+<p:sld xmlns:a="http://schemas.openxmlformats.org/drawingml/2006/main" xmlns:r="http://schemas.openxmlformats.org/officeDocument/2006/relationships" xmlns:p="http://schemas.openxmlformats.org/presentationml/2006/main">
+  <p:cSld>
+    <p:spTree>
+      <p:nvGrpSpPr>
+        <p:cNvPr id="1" name=""/>
+        <p:cNvGrpSpPr/>
+        <p:nvPr/>
+      </p:nvGrpSpPr>
+      <p:grpSpPr>
+        <a:xfrm>
+          <a:off x="0" y="0"/>
+          <a:ext cx="0" cy="0"/>
+          <a:chOff x="0" y="0"/>
+          <a:chExt cx="0" cy="0"/>
+        </a:xfrm>
+      </p:grpSpPr>
+      <p:sp>
+        <p:nvSpPr>
+          <p:cNvPr id="2" name="제목 1"/>
+          <p:cNvSpPr>
+            <a:spLocks noGrp="1"/>
+          </p:cNvSpPr>
+          <p:nvPr>
+            <p:ph type="title"/>
+          </p:nvPr>
+        </p:nvSpPr>
+        <p:spPr/>
+        <p:txBody>
+          <a:bodyPr/>
+          <a:lstStyle/>
+          <a:p>
+            <a:r>
+              <a:rPr lang="en-US" altLang="ko-KR" dirty="0" smtClean="0"/>
+              <a:t>Meta-path-based topological features</a:t>
+            </a:r>
+            <a:endParaRPr lang="ko-KR" altLang="en-US" dirty="0"/>
+          </a:p>
+        </p:txBody>
+      </p:sp>
+      <p:sp>
+        <p:nvSpPr>
+          <p:cNvPr id="3" name="내용 개체 틀 2"/>
+          <p:cNvSpPr>
+            <a:spLocks noGrp="1"/>
+          </p:cNvSpPr>
+          <p:nvPr>
+            <p:ph idx="1"/>
+          </p:nvPr>
+        </p:nvSpPr>
+        <p:spPr/>
+        <p:txBody>
+          <a:bodyPr>
+            <a:normAutofit/>
+          </a:bodyPr>
+          <a:lstStyle/>
+          <a:p>
+            <a:r>
+              <a:rPr lang="en-US" altLang="ko-KR" dirty="0" smtClean="0"/>
+              <a:t>Two measures of topological features were calculated.</a:t>
+            </a:r>
+          </a:p>
+          <a:p>
+            <a:endParaRPr lang="en-US" altLang="ko-KR" dirty="0"/>
+          </a:p>
+          <a:p>
+            <a:r>
+              <a:rPr lang="en-US" altLang="ko-KR" dirty="0" smtClean="0"/>
+              <a:t>Path Count ( PC )</a:t>
+            </a:r>
+          </a:p>
+          <a:p>
+            <a:pPr lvl="1"/>
+            <a:r>
+              <a:rPr lang="en-US" altLang="ko-KR" dirty="0" smtClean="0"/>
+              <a:t>The number of path instances between nodes I and j, which corresponds to the value of element in the commuting matrix.</a:t>
+            </a:r>
+          </a:p>
+          <a:p>
+            <a:pPr lvl="1"/>
+            <a:endParaRPr lang="en-US" altLang="ko-KR" dirty="0" smtClean="0"/>
+          </a:p>
+          <a:p>
+            <a:r>
+              <a:rPr lang="en-US" altLang="ko-KR" dirty="0" smtClean="0"/>
+              <a:t>Random Walk ( RW )</a:t>
+            </a:r>
+          </a:p>
+          <a:p>
+            <a:pPr lvl="1"/>
+            <a:r>
+              <a:rPr lang="en-US" altLang="ko-KR" dirty="0" smtClean="0"/>
+              <a:t>Based on the overall connectivity of the network.</a:t>
+            </a:r>
+          </a:p>
+          <a:p>
+            <a:pPr lvl="1"/>
+            <a:r>
+              <a:rPr lang="en-US" altLang="ko-KR" dirty="0" smtClean="0"/>
+              <a:t>As a normalization process to the number of path instances.</a:t>
+            </a:r>
+          </a:p>
+          <a:p>
+            <a:pPr lvl="1"/>
+            <a:r>
+              <a:rPr lang="en-US" altLang="ko-KR" dirty="0" smtClean="0"/>
+              <a:t>Calculated </a:t>
+            </a:r>
+            <a:r>
+              <a:rPr lang="en-US" altLang="ko-KR" sz="1700" dirty="0" err="1" smtClean="0"/>
+              <a:t>P</a:t>
+            </a:r>
+            <a:r>
+              <a:rPr lang="en-US" altLang="ko-KR" dirty="0" err="1" smtClean="0"/>
+              <a:t>C</a:t>
+            </a:r>
+            <a:r>
+              <a:rPr lang="en-US" altLang="ko-KR" sz="1700" dirty="0" err="1" smtClean="0"/>
+              <a:t>ij</a:t>
+            </a:r>
+            <a:r>
+              <a:rPr lang="en-US" altLang="ko-KR" sz="1700" dirty="0" smtClean="0"/>
+              <a:t> </a:t>
+            </a:r>
+            <a:r>
+              <a:rPr lang="en-US" altLang="ko-KR" dirty="0"/>
+              <a:t>/</a:t>
+            </a:r>
+            <a:r>
+              <a:rPr lang="en-US" altLang="ko-KR" sz="1700" dirty="0"/>
+              <a:t> </a:t>
+            </a:r>
+            <a:r>
+              <a:rPr lang="en-US" altLang="ko-KR" sz="1700" dirty="0" err="1" smtClean="0"/>
+              <a:t>P</a:t>
+            </a:r>
+            <a:r>
+              <a:rPr lang="en-US" altLang="ko-KR" dirty="0" err="1" smtClean="0"/>
+              <a:t>C</a:t>
+            </a:r>
+            <a:r>
+              <a:rPr lang="en-US" altLang="ko-KR" sz="1700" dirty="0" err="1" smtClean="0"/>
+              <a:t>i</a:t>
+            </a:r>
+            <a:r>
+              <a:rPr lang="en-US" altLang="ko-KR" sz="1700" dirty="0" smtClean="0"/>
+              <a:t> </a:t>
+            </a:r>
+            <a:r>
+              <a:rPr lang="en-US" altLang="ko-KR" sz="800" dirty="0" smtClean="0"/>
+              <a:t>•</a:t>
+            </a:r>
+            <a:r>
+              <a:rPr lang="en-US" altLang="ko-KR" dirty="0" smtClean="0"/>
+              <a:t>, where </a:t>
+            </a:r>
+            <a:r>
+              <a:rPr lang="en-US" altLang="ko-KR" dirty="0" err="1" smtClean="0"/>
+              <a:t>PC</a:t>
+            </a:r>
+            <a:r>
+              <a:rPr lang="en-US" altLang="ko-KR" sz="1700" dirty="0" err="1" smtClean="0"/>
+              <a:t>i</a:t>
+            </a:r>
+            <a:r>
+              <a:rPr lang="en-US" altLang="ko-KR" sz="800" dirty="0"/>
+              <a:t>,• </a:t>
+            </a:r>
+            <a:r>
+              <a:rPr lang="en-US" altLang="ko-KR" sz="800" dirty="0" smtClean="0"/>
+              <a:t> </a:t>
+            </a:r>
+            <a:r>
+              <a:rPr lang="en-US" altLang="ko-KR" dirty="0" smtClean="0"/>
+              <a:t>are </a:t>
+            </a:r>
+            <a:r>
+              <a:rPr lang="en-US" altLang="ko-KR" dirty="0"/>
+              <a:t>row-wise summations.</a:t>
+            </a:r>
+            <a:endParaRPr lang="en-US" altLang="ko-KR" dirty="0" smtClean="0"/>
+          </a:p>
+        </p:txBody>
+      </p:sp>
+    </p:spTree>
+    <p:extLst>
+      <p:ext uri="{BB962C8B-B14F-4D97-AF65-F5344CB8AC3E}">
+        <p14:creationId xmlns:p14="http://schemas.microsoft.com/office/powerpoint/2010/main" val="1197378224"/>
+      </p:ext>
+    </p:extLst>
+  </p:cSld>
+  <p:clrMapOvr>
+    <a:masterClrMapping/>
+  </p:clrMapOvr>
+  <p:timing>
+    <p:tnLst>
+      <p:par>
+        <p:cTn id="1" dur="indefinite" restart="never" nodeType="tmRoot"/>
+      </p:par>
+    </p:tnLst>
+  </p:timing>
+</p:sld>
+</file>
+
+<file path=ppt/slides/slide11.xml><?xml version="1.0" encoding="utf-8"?>
+<p:sld xmlns:a="http://schemas.openxmlformats.org/drawingml/2006/main" xmlns:r="http://schemas.openxmlformats.org/officeDocument/2006/relationships" xmlns:p="http://schemas.openxmlformats.org/presentationml/2006/main">
+  <p:cSld>
+    <p:spTree>
+      <p:nvGrpSpPr>
+        <p:cNvPr id="1" name=""/>
+        <p:cNvGrpSpPr/>
+        <p:nvPr/>
+      </p:nvGrpSpPr>
+      <p:grpSpPr>
+        <a:xfrm>
+          <a:off x="0" y="0"/>
+          <a:ext cx="0" cy="0"/>
+          <a:chOff x="0" y="0"/>
+          <a:chExt cx="0" cy="0"/>
+        </a:xfrm>
+      </p:grpSpPr>
+      <p:pic>
+        <p:nvPicPr>
+          <p:cNvPr id="4101" name="Picture 5" descr="C:\Users\MYCOM\Desktop\제목 없음2.png"/>
+          <p:cNvPicPr>
+            <a:picLocks noChangeAspect="1" noChangeArrowheads="1"/>
+          </p:cNvPicPr>
+          <p:nvPr/>
+        </p:nvPicPr>
+        <p:blipFill>
+          <a:blip r:embed="rId2">
+            <a:extLst>
+              <a:ext uri="{28A0092B-C50C-407E-A947-70E740481C1C}">
+                <a14:useLocalDpi xmlns:a14="http://schemas.microsoft.com/office/drawing/2010/main" val="0"/>
+              </a:ext>
+            </a:extLst>
+          </a:blip>
+          <a:srcRect/>
+          <a:stretch>
+            <a:fillRect/>
+          </a:stretch>
+        </p:blipFill>
+        <p:spPr bwMode="auto">
+          <a:xfrm>
+            <a:off x="5981700" y="4671110"/>
+            <a:ext cx="5981700" cy="1335420"/>
+          </a:xfrm>
+          <a:prstGeom prst="rect">
+            <a:avLst/>
+          </a:prstGeom>
+          <a:noFill/>
+          <a:extLst>
+            <a:ext uri="{909E8E84-426E-40DD-AFC4-6F175D3DCCD1}">
+              <a14:hiddenFill xmlns:a14="http://schemas.microsoft.com/office/drawing/2010/main">
+                <a:solidFill>
+                  <a:srgbClr val="FFFFFF"/>
+                </a:solidFill>
+              </a14:hiddenFill>
+            </a:ext>
+          </a:extLst>
+        </p:spPr>
+      </p:pic>
+      <p:pic>
+        <p:nvPicPr>
+          <p:cNvPr id="4102" name="Picture 6" descr="C:\Users\MYCOM\Desktop\제목 없음1-1.png"/>
+          <p:cNvPicPr>
+            <a:picLocks noChangeAspect="1" noChangeArrowheads="1"/>
+          </p:cNvPicPr>
+          <p:nvPr/>
+        </p:nvPicPr>
+        <p:blipFill>
+          <a:blip r:embed="rId3">
+            <a:extLst>
+              <a:ext uri="{28A0092B-C50C-407E-A947-70E740481C1C}">
+                <a14:useLocalDpi xmlns:a14="http://schemas.microsoft.com/office/drawing/2010/main" val="0"/>
+              </a:ext>
+            </a:extLst>
+          </a:blip>
+          <a:srcRect/>
+          <a:stretch>
+            <a:fillRect/>
+          </a:stretch>
+        </p:blipFill>
+        <p:spPr bwMode="auto">
+          <a:xfrm>
+            <a:off x="5981700" y="909715"/>
+            <a:ext cx="5981700" cy="3777581"/>
+          </a:xfrm>
+          <a:prstGeom prst="rect">
+            <a:avLst/>
+          </a:prstGeom>
+          <a:noFill/>
+          <a:extLst>
+            <a:ext uri="{909E8E84-426E-40DD-AFC4-6F175D3DCCD1}">
+              <a14:hiddenFill xmlns:a14="http://schemas.microsoft.com/office/drawing/2010/main">
+                <a:solidFill>
+                  <a:srgbClr val="FFFFFF"/>
+                </a:solidFill>
+              </a14:hiddenFill>
+            </a:ext>
+          </a:extLst>
+        </p:spPr>
+      </p:pic>
+      <p:pic>
+        <p:nvPicPr>
+          <p:cNvPr id="4103" name="Picture 7" descr="C:\Users\MYCOM\Desktop\제목 없음1.png"/>
+          <p:cNvPicPr>
+            <a:picLocks noChangeAspect="1" noChangeArrowheads="1"/>
+          </p:cNvPicPr>
+          <p:nvPr/>
+        </p:nvPicPr>
+        <p:blipFill>
+          <a:blip r:embed="rId4">
+            <a:extLst>
+              <a:ext uri="{28A0092B-C50C-407E-A947-70E740481C1C}">
+                <a14:useLocalDpi xmlns:a14="http://schemas.microsoft.com/office/drawing/2010/main" val="0"/>
+              </a:ext>
+            </a:extLst>
+          </a:blip>
+          <a:srcRect/>
+          <a:stretch>
+            <a:fillRect/>
+          </a:stretch>
+        </p:blipFill>
+        <p:spPr bwMode="auto">
+          <a:xfrm>
+            <a:off x="38100" y="585865"/>
+            <a:ext cx="5981700" cy="3792129"/>
+          </a:xfrm>
+          <a:prstGeom prst="rect">
+            <a:avLst/>
+          </a:prstGeom>
+          <a:noFill/>
+          <a:extLst>
+            <a:ext uri="{909E8E84-426E-40DD-AFC4-6F175D3DCCD1}">
+              <a14:hiddenFill xmlns:a14="http://schemas.microsoft.com/office/drawing/2010/main">
+                <a:solidFill>
+                  <a:srgbClr val="FFFFFF"/>
+                </a:solidFill>
+              </a14:hiddenFill>
+            </a:ext>
+          </a:extLst>
+        </p:spPr>
+      </p:pic>
+      <p:sp>
+        <p:nvSpPr>
+          <p:cNvPr id="4" name="제목 3"/>
+          <p:cNvSpPr>
+            <a:spLocks noGrp="1"/>
+          </p:cNvSpPr>
+          <p:nvPr>
+            <p:ph type="title"/>
+          </p:nvPr>
+        </p:nvSpPr>
+        <p:spPr/>
+        <p:txBody>
+          <a:bodyPr/>
+          <a:lstStyle/>
+          <a:p>
+            <a:endParaRPr lang="ko-KR" altLang="en-US"/>
+          </a:p>
+        </p:txBody>
+      </p:sp>
+      <p:pic>
+        <p:nvPicPr>
+          <p:cNvPr id="4104" name="Picture 8" descr="C:\Users\MYCOM\Desktop\제목 없음0.png"/>
+          <p:cNvPicPr>
+            <a:picLocks noChangeAspect="1" noChangeArrowheads="1"/>
+          </p:cNvPicPr>
+          <p:nvPr/>
+        </p:nvPicPr>
+        <p:blipFill>
+          <a:blip r:embed="rId5">
+            <a:extLst>
+              <a:ext uri="{28A0092B-C50C-407E-A947-70E740481C1C}">
+                <a14:useLocalDpi xmlns:a14="http://schemas.microsoft.com/office/drawing/2010/main" val="0"/>
+              </a:ext>
+            </a:extLst>
+          </a:blip>
+          <a:srcRect/>
+          <a:stretch>
+            <a:fillRect/>
+          </a:stretch>
+        </p:blipFill>
+        <p:spPr bwMode="auto">
+          <a:xfrm>
+            <a:off x="5981700" y="690641"/>
+            <a:ext cx="5981700" cy="207968"/>
+          </a:xfrm>
+          <a:prstGeom prst="rect">
+            <a:avLst/>
+          </a:prstGeom>
+          <a:noFill/>
+          <a:extLst>
+            <a:ext uri="{909E8E84-426E-40DD-AFC4-6F175D3DCCD1}">
+              <a14:hiddenFill xmlns:a14="http://schemas.microsoft.com/office/drawing/2010/main">
+                <a:solidFill>
+                  <a:srgbClr val="FFFFFF"/>
+                </a:solidFill>
+              </a14:hiddenFill>
+            </a:ext>
+          </a:extLst>
+        </p:spPr>
+      </p:pic>
+    </p:spTree>
+    <p:extLst>
+      <p:ext uri="{BB962C8B-B14F-4D97-AF65-F5344CB8AC3E}">
+        <p14:creationId xmlns:p14="http://schemas.microsoft.com/office/powerpoint/2010/main" val="1013649426"/>
+      </p:ext>
+    </p:extLst>
+  </p:cSld>
+  <p:clrMapOvr>
+    <a:masterClrMapping/>
+  </p:clrMapOvr>
+  <p:timing>
+    <p:tnLst>
+      <p:par>
+        <p:cTn id="1" dur="indefinite" restart="never" nodeType="tmRoot"/>
+      </p:par>
+    </p:tnLst>
+  </p:timing>
+</p:sld>
+</file>
+
+<file path=ppt/slides/slide12.xml><?xml version="1.0" encoding="utf-8"?>
+<p:sld xmlns:a="http://schemas.openxmlformats.org/drawingml/2006/main" xmlns:r="http://schemas.openxmlformats.org/officeDocument/2006/relationships" xmlns:p="http://schemas.openxmlformats.org/presentationml/2006/main">
+  <p:cSld>
+    <p:spTree>
+      <p:nvGrpSpPr>
+        <p:cNvPr id="1" name=""/>
+        <p:cNvGrpSpPr/>
+        <p:nvPr/>
+      </p:nvGrpSpPr>
+      <p:grpSpPr>
+        <a:xfrm>
+          <a:off x="0" y="0"/>
+          <a:ext cx="0" cy="0"/>
+          <a:chOff x="0" y="0"/>
+          <a:chExt cx="0" cy="0"/>
+        </a:xfrm>
+      </p:grpSpPr>
+      <p:sp>
+        <p:nvSpPr>
+          <p:cNvPr id="2" name="제목 1"/>
+          <p:cNvSpPr>
+            <a:spLocks noGrp="1"/>
+          </p:cNvSpPr>
+          <p:nvPr>
+            <p:ph type="title"/>
+          </p:nvPr>
+        </p:nvSpPr>
+        <p:spPr/>
+        <p:txBody>
+          <a:bodyPr/>
+          <a:lstStyle/>
+          <a:p>
+            <a:r>
+              <a:rPr lang="en-US" altLang="ko-KR" dirty="0" smtClean="0"/>
+              <a:t>Meta-path-based topological features</a:t>
+            </a:r>
+            <a:endParaRPr lang="ko-KR" altLang="en-US" dirty="0"/>
+          </a:p>
+        </p:txBody>
+      </p:sp>
+      <p:sp>
+        <p:nvSpPr>
+          <p:cNvPr id="3" name="내용 개체 틀 2"/>
+          <p:cNvSpPr>
+            <a:spLocks noGrp="1"/>
+          </p:cNvSpPr>
+          <p:nvPr>
+            <p:ph idx="1"/>
+          </p:nvPr>
+        </p:nvSpPr>
+        <p:spPr/>
+        <p:txBody>
+          <a:bodyPr>
+            <a:normAutofit/>
+          </a:bodyPr>
+          <a:lstStyle/>
+          <a:p>
+            <a:r>
+              <a:rPr lang="en-US" altLang="ko-KR" dirty="0" smtClean="0"/>
+              <a:t>The meta-path topological features</a:t>
+            </a:r>
+            <a:r>
+              <a:rPr lang="ko-KR" altLang="en-US" dirty="0"/>
+              <a:t> </a:t>
+            </a:r>
+            <a:r>
+              <a:rPr lang="en-US" altLang="ko-KR" dirty="0" smtClean="0"/>
+              <a:t>were encoded in commuting matrixes, calculated by multiplying several adjacency matrixes.</a:t>
+            </a:r>
+          </a:p>
+          <a:p>
+            <a:endParaRPr lang="en-US" altLang="ko-KR" dirty="0" smtClean="0"/>
+          </a:p>
+        </p:txBody>
+      </p:sp>
+      <p:pic>
+        <p:nvPicPr>
+          <p:cNvPr id="2050" name="Picture 2" descr="C:\Users\MYCOM\Desktop\제목 없음.png"/>
+          <p:cNvPicPr>
+            <a:picLocks noChangeAspect="1" noChangeArrowheads="1"/>
+          </p:cNvPicPr>
+          <p:nvPr/>
+        </p:nvPicPr>
+        <p:blipFill>
+          <a:blip r:embed="rId2">
+            <a:extLst>
+              <a:ext uri="{28A0092B-C50C-407E-A947-70E740481C1C}">
+                <a14:useLocalDpi xmlns:a14="http://schemas.microsoft.com/office/drawing/2010/main" val="0"/>
+              </a:ext>
+            </a:extLst>
+          </a:blip>
+          <a:srcRect/>
+          <a:stretch>
+            <a:fillRect/>
+          </a:stretch>
+        </p:blipFill>
+        <p:spPr bwMode="auto">
+          <a:xfrm>
+            <a:off x="1828800" y="3098196"/>
+            <a:ext cx="8243888" cy="3512154"/>
+          </a:xfrm>
+          <a:prstGeom prst="rect">
+            <a:avLst/>
+          </a:prstGeom>
+          <a:noFill/>
+          <a:extLst>
+            <a:ext uri="{909E8E84-426E-40DD-AFC4-6F175D3DCCD1}">
+              <a14:hiddenFill xmlns:a14="http://schemas.microsoft.com/office/drawing/2010/main">
+                <a:solidFill>
+                  <a:srgbClr val="FFFFFF"/>
+                </a:solidFill>
+              </a14:hiddenFill>
+            </a:ext>
+          </a:extLst>
+        </p:spPr>
+      </p:pic>
+    </p:spTree>
+    <p:extLst>
+      <p:ext uri="{BB962C8B-B14F-4D97-AF65-F5344CB8AC3E}">
+        <p14:creationId xmlns:p14="http://schemas.microsoft.com/office/powerpoint/2010/main" val="2678566475"/>
+      </p:ext>
+    </p:extLst>
+  </p:cSld>
+  <p:clrMapOvr>
+    <a:masterClrMapping/>
+  </p:clrMapOvr>
+  <p:timing>
+    <p:tnLst>
+      <p:par>
+        <p:cTn id="1" dur="indefinite" restart="never" nodeType="tmRoot"/>
+      </p:par>
+    </p:tnLst>
+  </p:timing>
+</p:sld>
+</file>
+
+<file path=ppt/slides/slide13.xml><?xml version="1.0" encoding="utf-8"?>
+<p:sld xmlns:a="http://schemas.openxmlformats.org/drawingml/2006/main" xmlns:r="http://schemas.openxmlformats.org/officeDocument/2006/relationships" xmlns:p="http://schemas.openxmlformats.org/presentationml/2006/main">
+  <p:cSld>
+    <p:spTree>
+      <p:nvGrpSpPr>
+        <p:cNvPr id="1" name=""/>
+        <p:cNvGrpSpPr/>
+        <p:nvPr/>
+      </p:nvGrpSpPr>
+      <p:grpSpPr>
+        <a:xfrm>
+          <a:off x="0" y="0"/>
+          <a:ext cx="0" cy="0"/>
+          <a:chOff x="0" y="0"/>
+          <a:chExt cx="0" cy="0"/>
+        </a:xfrm>
+      </p:grpSpPr>
+      <p:sp>
+        <p:nvSpPr>
+          <p:cNvPr id="2" name="제목 1"/>
+          <p:cNvSpPr>
+            <a:spLocks noGrp="1"/>
+          </p:cNvSpPr>
+          <p:nvPr>
+            <p:ph type="title"/>
+          </p:nvPr>
+        </p:nvSpPr>
+        <p:spPr/>
+        <p:txBody>
+          <a:bodyPr/>
+          <a:lstStyle/>
+          <a:p>
+            <a:r>
+              <a:rPr lang="en-US" altLang="ko-KR" dirty="0" smtClean="0"/>
+              <a:t>Machine learning dataset</a:t>
+            </a:r>
+            <a:endParaRPr lang="ko-KR" altLang="en-US" dirty="0"/>
+          </a:p>
+        </p:txBody>
+      </p:sp>
+      <p:sp>
+        <p:nvSpPr>
+          <p:cNvPr id="3" name="내용 개체 틀 2"/>
+          <p:cNvSpPr>
+            <a:spLocks noGrp="1"/>
+          </p:cNvSpPr>
+          <p:nvPr>
+            <p:ph idx="1"/>
+          </p:nvPr>
+        </p:nvSpPr>
+        <p:spPr/>
+        <p:txBody>
+          <a:bodyPr>
+            <a:normAutofit fontScale="92500" lnSpcReduction="10000"/>
+          </a:bodyPr>
+          <a:lstStyle/>
+          <a:p>
+            <a:r>
+              <a:rPr lang="en-US" altLang="ko-KR" dirty="0" smtClean="0"/>
+              <a:t>In order to build supervised learning models, both positive and negative labels are required.</a:t>
+            </a:r>
+            <a:endParaRPr lang="en-US" altLang="ko-KR" dirty="0"/>
+          </a:p>
+          <a:p>
+            <a:pPr lvl="1"/>
+            <a:r>
+              <a:rPr lang="en-US" altLang="ko-KR" dirty="0" smtClean="0"/>
+              <a:t>A total of 5,387 positively labeled links from </a:t>
+            </a:r>
+            <a:r>
+              <a:rPr lang="en-US" altLang="ko-KR" dirty="0" err="1" smtClean="0"/>
+              <a:t>Drugbank</a:t>
+            </a:r>
+            <a:endParaRPr lang="en-US" altLang="ko-KR" dirty="0" smtClean="0"/>
+          </a:p>
+          <a:p>
+            <a:pPr lvl="1"/>
+            <a:r>
+              <a:rPr lang="en-US" altLang="ko-KR" dirty="0" smtClean="0"/>
+              <a:t>Positive label: observed link</a:t>
+            </a:r>
+          </a:p>
+          <a:p>
+            <a:pPr lvl="1"/>
+            <a:r>
+              <a:rPr lang="en-US" altLang="ko-KR" dirty="0" smtClean="0"/>
+              <a:t>Negative label: unobserved and experimental bioactivity value of pairs is greater than 10 </a:t>
+            </a:r>
+            <a:r>
+              <a:rPr lang="el-GR" altLang="ko-KR" dirty="0"/>
+              <a:t>μ</a:t>
+            </a:r>
+            <a:r>
+              <a:rPr lang="en-US" altLang="ko-KR" dirty="0" smtClean="0"/>
+              <a:t>m, using </a:t>
+            </a:r>
+            <a:r>
+              <a:rPr lang="en-US" altLang="ko-KR" dirty="0" err="1" smtClean="0"/>
+              <a:t>PubChem</a:t>
+            </a:r>
+            <a:r>
+              <a:rPr lang="en-US" altLang="ko-KR" dirty="0" smtClean="0"/>
+              <a:t> </a:t>
+            </a:r>
+            <a:r>
+              <a:rPr lang="en-US" altLang="ko-KR" dirty="0" err="1" smtClean="0"/>
+              <a:t>BioAssay</a:t>
+            </a:r>
+            <a:r>
+              <a:rPr lang="en-US" altLang="ko-KR" dirty="0" smtClean="0"/>
+              <a:t> DB.</a:t>
+            </a:r>
+          </a:p>
+          <a:p>
+            <a:pPr lvl="1"/>
+            <a:r>
+              <a:rPr lang="en-US" altLang="ko-KR" dirty="0"/>
+              <a:t>Accordingly, Obtained 26,682 negative labels out of </a:t>
+            </a:r>
+            <a:r>
+              <a:rPr lang="en-US" altLang="ko-KR" dirty="0" smtClean="0"/>
+              <a:t>over  </a:t>
+            </a:r>
+            <a:r>
+              <a:rPr lang="en-US" altLang="ko-KR" dirty="0"/>
+              <a:t>5.6 billion unobserved links in the Chem2Bio2RDF semantic network</a:t>
+            </a:r>
+            <a:r>
+              <a:rPr lang="en-US" altLang="ko-KR" dirty="0" smtClean="0"/>
+              <a:t>.</a:t>
+            </a:r>
+          </a:p>
+          <a:p>
+            <a:pPr lvl="1"/>
+            <a:endParaRPr lang="en-US" altLang="ko-KR" dirty="0" smtClean="0"/>
+          </a:p>
+          <a:p>
+            <a:r>
+              <a:rPr lang="en-US" altLang="ko-KR" dirty="0" smtClean="0"/>
+              <a:t>The positively and negatively labeled links were combined and randomly split into training set and test set by a ratio of 2 : 1</a:t>
+            </a:r>
+          </a:p>
+          <a:p>
+            <a:pPr lvl="1"/>
+            <a:r>
+              <a:rPr lang="en-US" altLang="ko-KR" dirty="0" smtClean="0"/>
+              <a:t>In the training set, 3,591 positively, and 17,788 negatively labeled links.</a:t>
+            </a:r>
+          </a:p>
+          <a:p>
+            <a:pPr lvl="1"/>
+            <a:r>
+              <a:rPr lang="en-US" altLang="ko-KR" dirty="0" smtClean="0"/>
+              <a:t>In the test set, 1,796 positively, and 8,894 negatively labeled links.</a:t>
+            </a:r>
+            <a:endParaRPr lang="en-US" altLang="ko-KR" dirty="0"/>
+          </a:p>
+          <a:p>
+            <a:pPr marL="457200" lvl="1" indent="0">
+              <a:buNone/>
+            </a:pPr>
+            <a:endParaRPr lang="en-US" altLang="ko-KR" dirty="0"/>
+          </a:p>
+        </p:txBody>
+      </p:sp>
+    </p:spTree>
+    <p:extLst>
+      <p:ext uri="{BB962C8B-B14F-4D97-AF65-F5344CB8AC3E}">
+        <p14:creationId xmlns:p14="http://schemas.microsoft.com/office/powerpoint/2010/main" val="2895292174"/>
+      </p:ext>
+    </p:extLst>
+  </p:cSld>
+  <p:clrMapOvr>
+    <a:masterClrMapping/>
+  </p:clrMapOvr>
+  <p:timing>
+    <p:tnLst>
+      <p:par>
+        <p:cTn id="1" dur="indefinite" restart="never" nodeType="tmRoot"/>
+      </p:par>
+    </p:tnLst>
+  </p:timing>
+</p:sld>
+</file>
+
+<file path=ppt/slides/slide14.xml><?xml version="1.0" encoding="utf-8"?>
+<p:sld xmlns:a="http://schemas.openxmlformats.org/drawingml/2006/main" xmlns:r="http://schemas.openxmlformats.org/officeDocument/2006/relationships" xmlns:p="http://schemas.openxmlformats.org/presentationml/2006/main">
+  <p:cSld>
+    <p:spTree>
+      <p:nvGrpSpPr>
+        <p:cNvPr id="1" name=""/>
+        <p:cNvGrpSpPr/>
+        <p:nvPr/>
+      </p:nvGrpSpPr>
+      <p:grpSpPr>
+        <a:xfrm>
+          <a:off x="0" y="0"/>
+          <a:ext cx="0" cy="0"/>
+          <a:chOff x="0" y="0"/>
+          <a:chExt cx="0" cy="0"/>
+        </a:xfrm>
+      </p:grpSpPr>
+      <p:sp>
+        <p:nvSpPr>
+          <p:cNvPr id="2" name="제목 1"/>
+          <p:cNvSpPr>
+            <a:spLocks noGrp="1"/>
+          </p:cNvSpPr>
+          <p:nvPr>
+            <p:ph type="title"/>
+          </p:nvPr>
+        </p:nvSpPr>
+        <p:spPr/>
+        <p:txBody>
+          <a:bodyPr/>
+          <a:lstStyle/>
+          <a:p>
+            <a:r>
+              <a:rPr lang="en-US" altLang="ko-KR" dirty="0" smtClean="0"/>
+              <a:t>Machine learning dataset</a:t>
+            </a:r>
+            <a:endParaRPr lang="ko-KR" altLang="en-US" dirty="0"/>
+          </a:p>
+        </p:txBody>
+      </p:sp>
+      <p:sp>
+        <p:nvSpPr>
+          <p:cNvPr id="3" name="내용 개체 틀 2"/>
+          <p:cNvSpPr>
+            <a:spLocks noGrp="1"/>
+          </p:cNvSpPr>
+          <p:nvPr>
+            <p:ph idx="1"/>
+          </p:nvPr>
+        </p:nvSpPr>
+        <p:spPr/>
+        <p:txBody>
+          <a:bodyPr>
+            <a:normAutofit fontScale="92500"/>
+          </a:bodyPr>
+          <a:lstStyle/>
+          <a:p>
+            <a:r>
+              <a:rPr lang="en-US" altLang="ko-KR" dirty="0" smtClean="0"/>
+              <a:t>In order to further examine the ability of the proposed framework, a mush larger set of DTIs were collected from the </a:t>
+            </a:r>
+            <a:r>
+              <a:rPr lang="en-US" altLang="ko-KR" dirty="0" err="1" smtClean="0"/>
+              <a:t>PubChem</a:t>
+            </a:r>
+            <a:r>
+              <a:rPr lang="en-US" altLang="ko-KR" dirty="0" smtClean="0"/>
+              <a:t> </a:t>
+            </a:r>
+            <a:r>
+              <a:rPr lang="en-US" altLang="ko-KR" dirty="0" err="1" smtClean="0"/>
+              <a:t>BioAssay</a:t>
+            </a:r>
+            <a:r>
+              <a:rPr lang="en-US" altLang="ko-KR" dirty="0" smtClean="0"/>
+              <a:t> database.</a:t>
+            </a:r>
+          </a:p>
+          <a:p>
+            <a:pPr lvl="1"/>
+            <a:r>
+              <a:rPr lang="en-US" altLang="ko-KR" dirty="0" err="1" smtClean="0"/>
+              <a:t>PubChem</a:t>
+            </a:r>
+            <a:r>
+              <a:rPr lang="en-US" altLang="ko-KR" dirty="0" smtClean="0"/>
+              <a:t> </a:t>
+            </a:r>
+            <a:r>
+              <a:rPr lang="en-US" altLang="ko-KR" dirty="0" err="1" smtClean="0"/>
+              <a:t>BioAssay</a:t>
+            </a:r>
+            <a:r>
+              <a:rPr lang="en-US" altLang="ko-KR" dirty="0" smtClean="0"/>
+              <a:t> categorizes depositor-provided </a:t>
+            </a:r>
+            <a:r>
+              <a:rPr lang="en-US" altLang="ko-KR" dirty="0" err="1" smtClean="0"/>
+              <a:t>bioactivites</a:t>
+            </a:r>
+            <a:r>
+              <a:rPr lang="en-US" altLang="ko-KR" dirty="0" smtClean="0"/>
+              <a:t> between compounds and protein targets into active, inactive, and unspecified groups, adding to assay descriptions and activity values.</a:t>
+            </a:r>
+          </a:p>
+          <a:p>
+            <a:pPr lvl="1"/>
+            <a:r>
+              <a:rPr lang="en-US" altLang="ko-KR" dirty="0" smtClean="0"/>
+              <a:t>Positive label : classified as active, activity values of less than 1</a:t>
+            </a:r>
+            <a:r>
+              <a:rPr lang="el-GR" altLang="ko-KR" dirty="0"/>
+              <a:t>μ</a:t>
+            </a:r>
+            <a:r>
+              <a:rPr lang="en-US" altLang="ko-KR" dirty="0" smtClean="0"/>
+              <a:t>m</a:t>
+            </a:r>
+          </a:p>
+          <a:p>
+            <a:pPr lvl="1"/>
+            <a:r>
+              <a:rPr lang="en-US" altLang="ko-KR" dirty="0" smtClean="0"/>
+              <a:t>Negative label : classified as inactive, activities for the interactions exist. </a:t>
+            </a:r>
+          </a:p>
+          <a:p>
+            <a:pPr lvl="1"/>
+            <a:endParaRPr lang="en-US" altLang="ko-KR" dirty="0"/>
+          </a:p>
+          <a:p>
+            <a:r>
+              <a:rPr lang="en-US" altLang="ko-KR" dirty="0" smtClean="0"/>
+              <a:t>Previous links from Chem2Bio2RDF constitute a training set.</a:t>
+            </a:r>
+          </a:p>
+          <a:p>
+            <a:r>
+              <a:rPr lang="en-US" altLang="ko-KR" dirty="0" smtClean="0"/>
+              <a:t>This links from </a:t>
+            </a:r>
+            <a:r>
+              <a:rPr lang="en-US" altLang="ko-KR" dirty="0" err="1" smtClean="0"/>
+              <a:t>PubChemBioAssay</a:t>
+            </a:r>
+            <a:r>
+              <a:rPr lang="en-US" altLang="ko-KR" dirty="0" smtClean="0"/>
+              <a:t> database </a:t>
+            </a:r>
+            <a:r>
+              <a:rPr lang="en-US" altLang="ko-KR" dirty="0"/>
+              <a:t>constitute</a:t>
+            </a:r>
+            <a:r>
+              <a:rPr lang="en-US" altLang="ko-KR" dirty="0" smtClean="0"/>
+              <a:t> a test set.</a:t>
+            </a:r>
+          </a:p>
+          <a:p>
+            <a:pPr lvl="1"/>
+            <a:endParaRPr lang="en-US" altLang="ko-KR" dirty="0" smtClean="0"/>
+          </a:p>
+        </p:txBody>
+      </p:sp>
+    </p:spTree>
+    <p:extLst>
+      <p:ext uri="{BB962C8B-B14F-4D97-AF65-F5344CB8AC3E}">
+        <p14:creationId xmlns:p14="http://schemas.microsoft.com/office/powerpoint/2010/main" val="3763995776"/>
+      </p:ext>
+    </p:extLst>
+  </p:cSld>
+  <p:clrMapOvr>
+    <a:masterClrMapping/>
+  </p:clrMapOvr>
+  <p:timing>
+    <p:tnLst>
+      <p:par>
+        <p:cTn id="1" dur="indefinite" restart="never" nodeType="tmRoot"/>
+      </p:par>
+    </p:tnLst>
+  </p:timing>
+</p:sld>
+</file>
+
+<file path=ppt/slides/slide15.xml><?xml version="1.0" encoding="utf-8"?>
+<p:sld xmlns:a="http://schemas.openxmlformats.org/drawingml/2006/main" xmlns:r="http://schemas.openxmlformats.org/officeDocument/2006/relationships" xmlns:p="http://schemas.openxmlformats.org/presentationml/2006/main">
+  <p:cSld>
+    <p:spTree>
+      <p:nvGrpSpPr>
+        <p:cNvPr id="1" name=""/>
+        <p:cNvGrpSpPr/>
+        <p:nvPr/>
+      </p:nvGrpSpPr>
+      <p:grpSpPr>
+        <a:xfrm>
+          <a:off x="0" y="0"/>
+          <a:ext cx="0" cy="0"/>
+          <a:chOff x="0" y="0"/>
+          <a:chExt cx="0" cy="0"/>
+        </a:xfrm>
+      </p:grpSpPr>
+      <p:sp>
+        <p:nvSpPr>
+          <p:cNvPr id="2" name="제목 1"/>
+          <p:cNvSpPr>
+            <a:spLocks noGrp="1"/>
+          </p:cNvSpPr>
+          <p:nvPr>
+            <p:ph type="title"/>
+          </p:nvPr>
+        </p:nvSpPr>
+        <p:spPr/>
+        <p:txBody>
+          <a:bodyPr/>
+          <a:lstStyle/>
+          <a:p>
+            <a:r>
+              <a:rPr lang="en-US" altLang="ko-KR" dirty="0" smtClean="0"/>
+              <a:t>Binary classification models</a:t>
+            </a:r>
+            <a:endParaRPr lang="ko-KR" altLang="en-US" dirty="0"/>
+          </a:p>
+        </p:txBody>
+      </p:sp>
+      <p:sp>
+        <p:nvSpPr>
+          <p:cNvPr id="3" name="내용 개체 틀 2"/>
+          <p:cNvSpPr>
+            <a:spLocks noGrp="1"/>
+          </p:cNvSpPr>
+          <p:nvPr>
+            <p:ph idx="1"/>
+          </p:nvPr>
+        </p:nvSpPr>
+        <p:spPr/>
+        <p:txBody>
+          <a:bodyPr>
+            <a:normAutofit fontScale="92500" lnSpcReduction="10000"/>
+          </a:bodyPr>
+          <a:lstStyle/>
+          <a:p>
+            <a:r>
+              <a:rPr lang="en-US" altLang="ko-KR" dirty="0" smtClean="0"/>
+              <a:t>To demonstrate how well the similarity neighboring links obtained from </a:t>
+            </a:r>
+            <a:r>
+              <a:rPr lang="en-US" altLang="ko-KR" dirty="0" err="1" smtClean="0"/>
+              <a:t>PubChem</a:t>
+            </a:r>
+            <a:r>
+              <a:rPr lang="en-US" altLang="ko-KR" dirty="0" smtClean="0"/>
+              <a:t> databases can improve link prediction </a:t>
+            </a:r>
+            <a:r>
+              <a:rPr lang="en-US" altLang="ko-KR" dirty="0" err="1" smtClean="0"/>
+              <a:t>preformance</a:t>
+            </a:r>
+            <a:r>
+              <a:rPr lang="en-US" altLang="ko-KR" dirty="0" smtClean="0"/>
+              <a:t>, we have constructed different machine learning models, based on two sets of path count topological features.</a:t>
+            </a:r>
+          </a:p>
+          <a:p>
+            <a:r>
+              <a:rPr lang="en-US" altLang="ko-KR" dirty="0" smtClean="0"/>
+              <a:t>Feature Ⅰ : </a:t>
+            </a:r>
+          </a:p>
+          <a:p>
+            <a:pPr lvl="1"/>
+            <a:r>
+              <a:rPr lang="en-US" altLang="ko-KR" dirty="0" smtClean="0"/>
+              <a:t>29 path count topological features, not included any meta-paths involving similarity neighboring links</a:t>
+            </a:r>
+          </a:p>
+          <a:p>
+            <a:r>
+              <a:rPr lang="en-US" altLang="ko-KR" dirty="0" smtClean="0"/>
+              <a:t>Feature Ⅱ :</a:t>
+            </a:r>
+          </a:p>
+          <a:p>
+            <a:pPr lvl="1"/>
+            <a:r>
+              <a:rPr lang="en-US" altLang="ko-KR" dirty="0" smtClean="0"/>
+              <a:t>All of path counts</a:t>
+            </a:r>
+          </a:p>
+          <a:p>
+            <a:r>
+              <a:rPr lang="en-US" altLang="ko-KR" dirty="0" smtClean="0"/>
+              <a:t>Feature Ⅲ : </a:t>
+            </a:r>
+          </a:p>
+          <a:p>
+            <a:pPr lvl="1"/>
+            <a:r>
+              <a:rPr lang="en-US" altLang="ko-KR" dirty="0" smtClean="0"/>
+              <a:t>Path count + Random walk ( 102 )</a:t>
+            </a:r>
+            <a:endParaRPr lang="en-US" altLang="ko-KR" dirty="0"/>
+          </a:p>
+        </p:txBody>
+      </p:sp>
+    </p:spTree>
+    <p:extLst>
+      <p:ext uri="{BB962C8B-B14F-4D97-AF65-F5344CB8AC3E}">
+        <p14:creationId xmlns:p14="http://schemas.microsoft.com/office/powerpoint/2010/main" val="1581618264"/>
+      </p:ext>
+    </p:extLst>
+  </p:cSld>
+  <p:clrMapOvr>
+    <a:masterClrMapping/>
+  </p:clrMapOvr>
+  <p:timing>
+    <p:tnLst>
+      <p:par>
+        <p:cTn id="1" dur="indefinite" restart="never" nodeType="tmRoot"/>
+      </p:par>
+    </p:tnLst>
+  </p:timing>
+</p:sld>
+</file>
+
+<file path=ppt/slides/slide16.xml><?xml version="1.0" encoding="utf-8"?>
+<p:sld xmlns:a="http://schemas.openxmlformats.org/drawingml/2006/main" xmlns:r="http://schemas.openxmlformats.org/officeDocument/2006/relationships" xmlns:p="http://schemas.openxmlformats.org/presentationml/2006/main">
+  <p:cSld>
+    <p:spTree>
+      <p:nvGrpSpPr>
+        <p:cNvPr id="1" name=""/>
+        <p:cNvGrpSpPr/>
+        <p:nvPr/>
+      </p:nvGrpSpPr>
+      <p:grpSpPr>
+        <a:xfrm>
+          <a:off x="0" y="0"/>
+          <a:ext cx="0" cy="0"/>
+          <a:chOff x="0" y="0"/>
+          <a:chExt cx="0" cy="0"/>
+        </a:xfrm>
+      </p:grpSpPr>
+      <p:sp>
+        <p:nvSpPr>
+          <p:cNvPr id="2" name="제목 1"/>
+          <p:cNvSpPr>
+            <a:spLocks noGrp="1"/>
+          </p:cNvSpPr>
+          <p:nvPr>
+            <p:ph type="title"/>
+          </p:nvPr>
+        </p:nvSpPr>
+        <p:spPr/>
+        <p:txBody>
+          <a:bodyPr/>
+          <a:lstStyle/>
+          <a:p>
+            <a:r>
+              <a:rPr lang="en-US" altLang="ko-KR" dirty="0" smtClean="0"/>
+              <a:t>Binary classification models</a:t>
+            </a:r>
+            <a:endParaRPr lang="ko-KR" altLang="en-US" dirty="0"/>
+          </a:p>
+        </p:txBody>
+      </p:sp>
+      <p:sp>
+        <p:nvSpPr>
+          <p:cNvPr id="3" name="내용 개체 틀 2"/>
+          <p:cNvSpPr>
+            <a:spLocks noGrp="1"/>
+          </p:cNvSpPr>
+          <p:nvPr>
+            <p:ph idx="1"/>
+          </p:nvPr>
+        </p:nvSpPr>
+        <p:spPr/>
+        <p:txBody>
+          <a:bodyPr>
+            <a:normAutofit/>
+          </a:bodyPr>
+          <a:lstStyle/>
+          <a:p>
+            <a:r>
+              <a:rPr lang="en-US" altLang="ko-KR" dirty="0" smtClean="0"/>
+              <a:t>Random Forest ( RF )</a:t>
+            </a:r>
+          </a:p>
+          <a:p>
+            <a:pPr lvl="1"/>
+            <a:r>
+              <a:rPr lang="en-US" altLang="ko-KR" dirty="0" smtClean="0"/>
+              <a:t>A collection of decision trees from bootstrap samples of the </a:t>
+            </a:r>
+            <a:r>
+              <a:rPr lang="en-US" altLang="ko-KR" dirty="0" err="1" smtClean="0"/>
+              <a:t>traning</a:t>
+            </a:r>
+            <a:r>
+              <a:rPr lang="en-US" altLang="ko-KR" dirty="0" smtClean="0"/>
+              <a:t> data without pruning.</a:t>
+            </a:r>
+          </a:p>
+          <a:p>
+            <a:pPr lvl="1"/>
+            <a:r>
+              <a:rPr lang="en-US" altLang="ko-KR" dirty="0" smtClean="0"/>
+              <a:t>Make predictions based on majority votes of the ensemble trees.</a:t>
+            </a:r>
+          </a:p>
+          <a:p>
+            <a:pPr lvl="1"/>
+            <a:r>
+              <a:rPr lang="en-US" altLang="ko-KR" dirty="0" smtClean="0"/>
+              <a:t>Takes advantage of Out-of-Bag error</a:t>
+            </a:r>
+          </a:p>
+          <a:p>
+            <a:pPr lvl="1"/>
+            <a:r>
+              <a:rPr lang="en-US" altLang="ko-KR" dirty="0" smtClean="0"/>
+              <a:t>So, there is no need to run cross-validation</a:t>
+            </a:r>
+          </a:p>
+          <a:p>
+            <a:pPr lvl="1"/>
+            <a:r>
+              <a:rPr lang="en-US" altLang="ko-KR" dirty="0" smtClean="0"/>
+              <a:t>RF can calculate the importance of features as well.</a:t>
+            </a:r>
+          </a:p>
+          <a:p>
+            <a:pPr lvl="1"/>
+            <a:r>
+              <a:rPr lang="en-US" altLang="ko-KR" dirty="0" smtClean="0"/>
+              <a:t>Either classification accuracies or node impurities are measured before and after permutations.</a:t>
+            </a:r>
+          </a:p>
+          <a:p>
+            <a:pPr lvl="2"/>
+            <a:r>
+              <a:rPr lang="en-US" altLang="ko-KR" dirty="0" smtClean="0"/>
+              <a:t>The difference in the measures is used to evaluate feature importance.</a:t>
+            </a:r>
+          </a:p>
+          <a:p>
+            <a:pPr marL="914400" lvl="2" indent="0">
+              <a:buNone/>
+            </a:pPr>
+            <a:endParaRPr lang="en-US" altLang="ko-KR" dirty="0"/>
+          </a:p>
+        </p:txBody>
+      </p:sp>
+    </p:spTree>
+    <p:extLst>
+      <p:ext uri="{BB962C8B-B14F-4D97-AF65-F5344CB8AC3E}">
+        <p14:creationId xmlns:p14="http://schemas.microsoft.com/office/powerpoint/2010/main" val="1297981039"/>
+      </p:ext>
+    </p:extLst>
+  </p:cSld>
+  <p:clrMapOvr>
+    <a:masterClrMapping/>
+  </p:clrMapOvr>
+  <p:timing>
+    <p:tnLst>
+      <p:par>
+        <p:cTn id="1" dur="indefinite" restart="never" nodeType="tmRoot"/>
+      </p:par>
+    </p:tnLst>
+  </p:timing>
+</p:sld>
+</file>
+
+<file path=ppt/slides/slide17.xml><?xml version="1.0" encoding="utf-8"?>
+<p:sld xmlns:a="http://schemas.openxmlformats.org/drawingml/2006/main" xmlns:r="http://schemas.openxmlformats.org/officeDocument/2006/relationships" xmlns:p="http://schemas.openxmlformats.org/presentationml/2006/main">
+  <p:cSld>
+    <p:spTree>
+      <p:nvGrpSpPr>
+        <p:cNvPr id="1" name=""/>
+        <p:cNvGrpSpPr/>
+        <p:nvPr/>
+      </p:nvGrpSpPr>
+      <p:grpSpPr>
+        <a:xfrm>
+          <a:off x="0" y="0"/>
+          <a:ext cx="0" cy="0"/>
+          <a:chOff x="0" y="0"/>
+          <a:chExt cx="0" cy="0"/>
+        </a:xfrm>
+      </p:grpSpPr>
+      <p:sp>
+        <p:nvSpPr>
+          <p:cNvPr id="2" name="제목 1"/>
+          <p:cNvSpPr>
+            <a:spLocks noGrp="1"/>
+          </p:cNvSpPr>
+          <p:nvPr>
+            <p:ph type="title"/>
+          </p:nvPr>
+        </p:nvSpPr>
+        <p:spPr/>
+        <p:txBody>
+          <a:bodyPr/>
+          <a:lstStyle/>
+          <a:p>
+            <a:r>
+              <a:rPr lang="en-US" altLang="ko-KR" dirty="0" smtClean="0"/>
+              <a:t>Binary classification models</a:t>
+            </a:r>
+            <a:endParaRPr lang="ko-KR" altLang="en-US" dirty="0"/>
+          </a:p>
+        </p:txBody>
+      </p:sp>
+      <p:sp>
+        <p:nvSpPr>
+          <p:cNvPr id="3" name="내용 개체 틀 2"/>
+          <p:cNvSpPr>
+            <a:spLocks noGrp="1"/>
+          </p:cNvSpPr>
+          <p:nvPr>
+            <p:ph idx="1"/>
+          </p:nvPr>
+        </p:nvSpPr>
+        <p:spPr/>
+        <p:txBody>
+          <a:bodyPr>
+            <a:normAutofit/>
+          </a:bodyPr>
+          <a:lstStyle/>
+          <a:p>
+            <a:r>
+              <a:rPr lang="en-US" altLang="ko-KR" dirty="0" smtClean="0"/>
+              <a:t>Support Vector Machine ( SVM )</a:t>
+            </a:r>
+          </a:p>
+          <a:p>
+            <a:pPr lvl="1"/>
+            <a:r>
+              <a:rPr lang="en-US" altLang="ko-KR" dirty="0" smtClean="0"/>
+              <a:t>Support Vector Machine is based on a statistical learning theory.</a:t>
+            </a:r>
+          </a:p>
+          <a:p>
+            <a:pPr lvl="1"/>
+            <a:endParaRPr lang="en-US" altLang="ko-KR" dirty="0" smtClean="0"/>
+          </a:p>
+          <a:p>
+            <a:pPr lvl="1"/>
+            <a:r>
+              <a:rPr lang="en-US" altLang="ko-KR" dirty="0" smtClean="0"/>
+              <a:t>A soft margin SVM with radial basis function (RBF) kernel in the Gaussian form was used in this study.</a:t>
+            </a:r>
+          </a:p>
+          <a:p>
+            <a:pPr lvl="1"/>
+            <a:endParaRPr lang="en-US" altLang="ko-KR" dirty="0" smtClean="0"/>
+          </a:p>
+          <a:p>
+            <a:pPr lvl="1"/>
+            <a:r>
+              <a:rPr lang="en-US" altLang="ko-KR" dirty="0" smtClean="0"/>
+              <a:t>The optimal values for tuning parameters ( C and </a:t>
+            </a:r>
+            <a:r>
+              <a:rPr lang="el-GR" altLang="ko-KR" dirty="0"/>
+              <a:t>λ</a:t>
+            </a:r>
+            <a:r>
+              <a:rPr lang="en-US" altLang="ko-KR" dirty="0" smtClean="0"/>
+              <a:t> ) were determined by a grid search using 10-fold across-validation</a:t>
+            </a:r>
+            <a:endParaRPr lang="en-US" altLang="ko-KR" dirty="0"/>
+          </a:p>
+        </p:txBody>
+      </p:sp>
+    </p:spTree>
+    <p:extLst>
+      <p:ext uri="{BB962C8B-B14F-4D97-AF65-F5344CB8AC3E}">
+        <p14:creationId xmlns:p14="http://schemas.microsoft.com/office/powerpoint/2010/main" val="1734599461"/>
+      </p:ext>
+    </p:extLst>
+  </p:cSld>
+  <p:clrMapOvr>
+    <a:masterClrMapping/>
+  </p:clrMapOvr>
+  <p:timing>
+    <p:tnLst>
+      <p:par>
+        <p:cTn id="1" dur="indefinite" restart="never" nodeType="tmRoot"/>
+      </p:par>
+    </p:tnLst>
+  </p:timing>
+</p:sld>
+</file>
+
+<file path=ppt/slides/slide18.xml><?xml version="1.0" encoding="utf-8"?>
+<p:sld xmlns:a="http://schemas.openxmlformats.org/drawingml/2006/main" xmlns:r="http://schemas.openxmlformats.org/officeDocument/2006/relationships" xmlns:p="http://schemas.openxmlformats.org/presentationml/2006/main">
+  <p:cSld>
+    <p:spTree>
+      <p:nvGrpSpPr>
+        <p:cNvPr id="1" name=""/>
+        <p:cNvGrpSpPr/>
+        <p:nvPr/>
+      </p:nvGrpSpPr>
+      <p:grpSpPr>
+        <a:xfrm>
+          <a:off x="0" y="0"/>
+          <a:ext cx="0" cy="0"/>
+          <a:chOff x="0" y="0"/>
+          <a:chExt cx="0" cy="0"/>
+        </a:xfrm>
+      </p:grpSpPr>
+      <p:sp>
+        <p:nvSpPr>
+          <p:cNvPr id="2" name="제목 1"/>
+          <p:cNvSpPr>
+            <a:spLocks noGrp="1"/>
+          </p:cNvSpPr>
+          <p:nvPr>
+            <p:ph type="title"/>
+          </p:nvPr>
+        </p:nvSpPr>
+        <p:spPr/>
+        <p:txBody>
+          <a:bodyPr/>
+          <a:lstStyle/>
+          <a:p>
+            <a:r>
+              <a:rPr lang="en-US" altLang="ko-KR" dirty="0" smtClean="0"/>
+              <a:t>Binary classification models</a:t>
+            </a:r>
+            <a:endParaRPr lang="ko-KR" altLang="en-US" dirty="0"/>
+          </a:p>
+        </p:txBody>
+      </p:sp>
+      <p:sp>
+        <p:nvSpPr>
+          <p:cNvPr id="3" name="내용 개체 틀 2"/>
+          <p:cNvSpPr>
+            <a:spLocks noGrp="1"/>
+          </p:cNvSpPr>
+          <p:nvPr>
+            <p:ph idx="1"/>
+          </p:nvPr>
+        </p:nvSpPr>
+        <p:spPr/>
+        <p:txBody>
+          <a:bodyPr>
+            <a:normAutofit/>
+          </a:bodyPr>
+          <a:lstStyle/>
+          <a:p>
+            <a:r>
+              <a:rPr lang="en-US" altLang="ko-KR" dirty="0" smtClean="0"/>
+              <a:t>F1-score</a:t>
+            </a:r>
+            <a:r>
+              <a:rPr lang="ko-KR" altLang="en-US" dirty="0" smtClean="0"/>
+              <a:t> </a:t>
+            </a:r>
+            <a:r>
+              <a:rPr lang="en-US" altLang="ko-KR" dirty="0" smtClean="0"/>
+              <a:t>can be used for statistical hypothesis testing for imbalanced datasets.</a:t>
+            </a:r>
+          </a:p>
+          <a:p>
+            <a:r>
+              <a:rPr lang="en-US" altLang="ko-KR" dirty="0" smtClean="0"/>
+              <a:t>F1-score is the harmonic mean of precision and recall</a:t>
+            </a:r>
+            <a:endParaRPr lang="en-US" altLang="ko-KR" dirty="0"/>
+          </a:p>
+        </p:txBody>
+      </p:sp>
+      <p:pic>
+        <p:nvPicPr>
+          <p:cNvPr id="5122" name="Picture 2" descr="C:\Users\MYCOM\Desktop\제목 없음.png"/>
+          <p:cNvPicPr>
+            <a:picLocks noChangeAspect="1" noChangeArrowheads="1"/>
+          </p:cNvPicPr>
+          <p:nvPr/>
+        </p:nvPicPr>
+        <p:blipFill>
+          <a:blip r:embed="rId2">
+            <a:extLst>
+              <a:ext uri="{28A0092B-C50C-407E-A947-70E740481C1C}">
+                <a14:useLocalDpi xmlns:a14="http://schemas.microsoft.com/office/drawing/2010/main" val="0"/>
+              </a:ext>
+            </a:extLst>
+          </a:blip>
+          <a:srcRect/>
+          <a:stretch>
+            <a:fillRect/>
+          </a:stretch>
+        </p:blipFill>
+        <p:spPr bwMode="auto">
+          <a:xfrm>
+            <a:off x="4005035" y="4204606"/>
+            <a:ext cx="3691240" cy="875393"/>
+          </a:xfrm>
+          <a:prstGeom prst="rect">
+            <a:avLst/>
+          </a:prstGeom>
+          <a:noFill/>
+          <a:extLst>
+            <a:ext uri="{909E8E84-426E-40DD-AFC4-6F175D3DCCD1}">
+              <a14:hiddenFill xmlns:a14="http://schemas.microsoft.com/office/drawing/2010/main">
+                <a:solidFill>
+                  <a:srgbClr val="FFFFFF"/>
+                </a:solidFill>
+              </a14:hiddenFill>
+            </a:ext>
+          </a:extLst>
+        </p:spPr>
+      </p:pic>
+    </p:spTree>
+    <p:extLst>
+      <p:ext uri="{BB962C8B-B14F-4D97-AF65-F5344CB8AC3E}">
+        <p14:creationId xmlns:p14="http://schemas.microsoft.com/office/powerpoint/2010/main" val="977163023"/>
+      </p:ext>
+    </p:extLst>
+  </p:cSld>
+  <p:clrMapOvr>
+    <a:masterClrMapping/>
+  </p:clrMapOvr>
+  <p:timing>
+    <p:tnLst>
+      <p:par>
+        <p:cTn id="1" dur="indefinite" restart="never" nodeType="tmRoot"/>
+      </p:par>
+    </p:tnLst>
+  </p:timing>
+</p:sld>
+</file>
+
+<file path=ppt/slides/slide19.xml><?xml version="1.0" encoding="utf-8"?>
+<p:sld xmlns:a="http://schemas.openxmlformats.org/drawingml/2006/main" xmlns:r="http://schemas.openxmlformats.org/officeDocument/2006/relationships" xmlns:p="http://schemas.openxmlformats.org/presentationml/2006/main">
+  <p:cSld>
+    <p:spTree>
+      <p:nvGrpSpPr>
+        <p:cNvPr id="1" name=""/>
+        <p:cNvGrpSpPr/>
+        <p:nvPr/>
+      </p:nvGrpSpPr>
+      <p:grpSpPr>
+        <a:xfrm>
+          <a:off x="0" y="0"/>
+          <a:ext cx="0" cy="0"/>
+          <a:chOff x="0" y="0"/>
+          <a:chExt cx="0" cy="0"/>
+        </a:xfrm>
+      </p:grpSpPr>
+      <p:sp>
+        <p:nvSpPr>
+          <p:cNvPr id="2" name="제목 1"/>
+          <p:cNvSpPr>
+            <a:spLocks noGrp="1"/>
+          </p:cNvSpPr>
+          <p:nvPr>
+            <p:ph type="title"/>
+          </p:nvPr>
+        </p:nvSpPr>
+        <p:spPr/>
+        <p:txBody>
+          <a:bodyPr/>
+          <a:lstStyle/>
+          <a:p>
+            <a:r>
+              <a:rPr lang="en-US" altLang="ko-KR" dirty="0" smtClean="0"/>
+              <a:t>Binary classification models</a:t>
+            </a:r>
+            <a:endParaRPr lang="ko-KR" altLang="en-US" dirty="0"/>
+          </a:p>
+        </p:txBody>
+      </p:sp>
+      <p:pic>
+        <p:nvPicPr>
+          <p:cNvPr id="6146" name="Picture 2" descr="C:\Users\MYCOM\Desktop\제목 없음5.png"/>
+          <p:cNvPicPr>
+            <a:picLocks noChangeAspect="1" noChangeArrowheads="1"/>
+          </p:cNvPicPr>
+          <p:nvPr/>
+        </p:nvPicPr>
+        <p:blipFill>
+          <a:blip r:embed="rId2">
+            <a:extLst>
+              <a:ext uri="{28A0092B-C50C-407E-A947-70E740481C1C}">
+                <a14:useLocalDpi xmlns:a14="http://schemas.microsoft.com/office/drawing/2010/main" val="0"/>
+              </a:ext>
+            </a:extLst>
+          </a:blip>
+          <a:srcRect/>
+          <a:stretch>
+            <a:fillRect/>
+          </a:stretch>
+        </p:blipFill>
+        <p:spPr bwMode="auto">
+          <a:xfrm>
+            <a:off x="827315" y="1390875"/>
+            <a:ext cx="7182340" cy="4385812"/>
+          </a:xfrm>
+          <a:prstGeom prst="rect">
+            <a:avLst/>
+          </a:prstGeom>
+          <a:noFill/>
+          <a:extLst>
+            <a:ext uri="{909E8E84-426E-40DD-AFC4-6F175D3DCCD1}">
+              <a14:hiddenFill xmlns:a14="http://schemas.microsoft.com/office/drawing/2010/main">
+                <a:solidFill>
+                  <a:srgbClr val="FFFFFF"/>
+                </a:solidFill>
+              </a14:hiddenFill>
+            </a:ext>
+          </a:extLst>
+        </p:spPr>
+      </p:pic>
+    </p:spTree>
+    <p:extLst>
+      <p:ext uri="{BB962C8B-B14F-4D97-AF65-F5344CB8AC3E}">
+        <p14:creationId xmlns:p14="http://schemas.microsoft.com/office/powerpoint/2010/main" val="1295554649"/>
+      </p:ext>
+    </p:extLst>
+  </p:cSld>
+  <p:clrMapOvr>
+    <a:masterClrMapping/>
+  </p:clrMapOvr>
+  <p:timing>
+    <p:tnLst>
+      <p:par>
+        <p:cTn id="1" dur="indefinite" restart="never" nodeType="tmRoot"/>
+      </p:par>
+    </p:tnLst>
+  </p:timing>
+</p:sld>
+</file>
+
+<file path=ppt/slides/slide2.xml><?xml version="1.0" encoding="utf-8"?>
+<p:sld xmlns:a="http://schemas.openxmlformats.org/drawingml/2006/main" xmlns:r="http://schemas.openxmlformats.org/officeDocument/2006/relationships" xmlns:p="http://schemas.openxmlformats.org/presentationml/2006/main">
+  <p:cSld>
+    <p:spTree>
+      <p:nvGrpSpPr>
+        <p:cNvPr id="1" name=""/>
+        <p:cNvGrpSpPr/>
+        <p:nvPr/>
+      </p:nvGrpSpPr>
+      <p:grpSpPr>
+        <a:xfrm>
+          <a:off x="0" y="0"/>
+          <a:ext cx="0" cy="0"/>
+          <a:chOff x="0" y="0"/>
+          <a:chExt cx="0" cy="0"/>
+        </a:xfrm>
+      </p:grpSpPr>
+      <p:sp>
+        <p:nvSpPr>
+          <p:cNvPr id="2" name="제목 1"/>
+          <p:cNvSpPr>
+            <a:spLocks noGrp="1"/>
+          </p:cNvSpPr>
+          <p:nvPr>
+            <p:ph type="title"/>
+          </p:nvPr>
+        </p:nvSpPr>
+        <p:spPr/>
+        <p:txBody>
+          <a:bodyPr/>
+          <a:lstStyle/>
+          <a:p>
+            <a:r>
+              <a:rPr lang="en-US" altLang="ko-KR" dirty="0" smtClean="0"/>
+              <a:t>Background</a:t>
+            </a:r>
+            <a:endParaRPr lang="ko-KR" altLang="en-US" dirty="0"/>
+          </a:p>
+        </p:txBody>
+      </p:sp>
+      <p:sp>
+        <p:nvSpPr>
+          <p:cNvPr id="3" name="내용 개체 틀 2"/>
+          <p:cNvSpPr>
+            <a:spLocks noGrp="1"/>
+          </p:cNvSpPr>
+          <p:nvPr>
+            <p:ph idx="1"/>
+          </p:nvPr>
+        </p:nvSpPr>
+        <p:spPr/>
+        <p:txBody>
+          <a:bodyPr>
+            <a:normAutofit fontScale="55000" lnSpcReduction="20000"/>
+          </a:bodyPr>
+          <a:lstStyle/>
+          <a:p>
+            <a:r>
+              <a:rPr lang="en-US" altLang="ko-KR" dirty="0" smtClean="0"/>
+              <a:t>Chemo genomics and chemical systems biology aim to accelerate drug discovery through in </a:t>
+            </a:r>
+            <a:r>
+              <a:rPr lang="en-US" altLang="ko-KR" dirty="0" err="1" smtClean="0"/>
+              <a:t>silico</a:t>
+            </a:r>
+            <a:r>
+              <a:rPr lang="en-US" altLang="ko-KR" dirty="0" smtClean="0"/>
+              <a:t> predictions..</a:t>
+            </a:r>
+          </a:p>
+          <a:p>
+            <a:endParaRPr lang="en-US" altLang="ko-KR" dirty="0" smtClean="0"/>
+          </a:p>
+          <a:p>
+            <a:r>
+              <a:rPr lang="en-US" altLang="ko-KR" dirty="0" smtClean="0"/>
+              <a:t>Combined chemical and biological network</a:t>
+            </a:r>
+          </a:p>
+          <a:p>
+            <a:pPr lvl="1"/>
+            <a:r>
+              <a:rPr lang="en-US" altLang="ko-KR" dirty="0" smtClean="0"/>
+              <a:t>1. Hypothesizing new indications for approved </a:t>
+            </a:r>
+            <a:r>
+              <a:rPr lang="en-US" altLang="ko-KR" dirty="0"/>
+              <a:t>d</a:t>
+            </a:r>
+            <a:r>
+              <a:rPr lang="en-US" altLang="ko-KR" dirty="0" smtClean="0"/>
+              <a:t>rugs with desired safety.</a:t>
+            </a:r>
+          </a:p>
+          <a:p>
+            <a:pPr lvl="1"/>
+            <a:r>
+              <a:rPr lang="en-US" altLang="ko-KR" dirty="0" smtClean="0"/>
+              <a:t>2. Proposing Combination therapy design.</a:t>
+            </a:r>
+          </a:p>
+          <a:p>
+            <a:pPr lvl="1"/>
+            <a:r>
+              <a:rPr lang="en-US" altLang="ko-KR" dirty="0" smtClean="0"/>
+              <a:t>3. Interpreting clinical side effects by revealing modes of drug actions.</a:t>
+            </a:r>
+          </a:p>
+          <a:p>
+            <a:pPr lvl="1"/>
+            <a:endParaRPr lang="en-US" altLang="ko-KR" dirty="0" smtClean="0"/>
+          </a:p>
+          <a:p>
+            <a:r>
+              <a:rPr lang="en-US" altLang="ko-KR" dirty="0" smtClean="0"/>
+              <a:t>Semantic standards and technologies facilitate data integration across multiple domains.</a:t>
+            </a:r>
+          </a:p>
+          <a:p>
+            <a:endParaRPr lang="en-US" altLang="ko-KR" dirty="0"/>
+          </a:p>
+          <a:p>
+            <a:r>
+              <a:rPr lang="en-US" altLang="ko-KR" dirty="0" smtClean="0"/>
+              <a:t>Several semantically linked datasets have been published to promote data mining in DR</a:t>
+            </a:r>
+          </a:p>
+          <a:p>
+            <a:pPr lvl="1"/>
+            <a:r>
+              <a:rPr lang="en-US" altLang="ko-KR" dirty="0" smtClean="0"/>
+              <a:t>ex) </a:t>
+            </a:r>
+            <a:r>
+              <a:rPr lang="en-US" altLang="ko-KR" dirty="0" err="1" smtClean="0"/>
+              <a:t>PubChemRDF</a:t>
+            </a:r>
+            <a:r>
+              <a:rPr lang="en-US" altLang="ko-KR" dirty="0" smtClean="0"/>
+              <a:t>, Chem2Bio2RDF, Bio2RDF, Open PHACTS etc.</a:t>
+            </a:r>
+          </a:p>
+          <a:p>
+            <a:pPr lvl="1"/>
+            <a:endParaRPr lang="en-US" altLang="ko-KR" dirty="0" smtClean="0"/>
+          </a:p>
+          <a:p>
+            <a:r>
+              <a:rPr lang="en-US" altLang="ko-KR" dirty="0" smtClean="0"/>
+              <a:t>A statistical model, SLAP, has been applied to Chem2Bio2RDF to predict direct links between compounds and proteins based on their indirect links or path.</a:t>
+            </a:r>
+          </a:p>
+          <a:p>
+            <a:endParaRPr lang="en-US" altLang="ko-KR" dirty="0"/>
+          </a:p>
+          <a:p>
+            <a:r>
+              <a:rPr lang="en-US" altLang="ko-KR" dirty="0" smtClean="0"/>
+              <a:t>SLAP is a novel and validated approach to predict DTIs(Drug-Target Interactions) outperformed existing alternatives.</a:t>
+            </a:r>
+            <a:endParaRPr lang="ko-KR" altLang="en-US" dirty="0"/>
+          </a:p>
+        </p:txBody>
+      </p:sp>
+    </p:spTree>
+    <p:extLst>
+      <p:ext uri="{BB962C8B-B14F-4D97-AF65-F5344CB8AC3E}">
+        <p14:creationId xmlns:p14="http://schemas.microsoft.com/office/powerpoint/2010/main" val="1600377115"/>
+      </p:ext>
+    </p:extLst>
+  </p:cSld>
+  <p:clrMapOvr>
+    <a:masterClrMapping/>
+  </p:clrMapOvr>
+  <p:timing>
+    <p:tnLst>
+      <p:par>
+        <p:cTn id="1" dur="indefinite" restart="never" nodeType="tmRoot"/>
+      </p:par>
+    </p:tnLst>
+  </p:timing>
+</p:sld>
+</file>
+
+<file path=ppt/slides/slide20.xml><?xml version="1.0" encoding="utf-8"?>
+<p:sld xmlns:a="http://schemas.openxmlformats.org/drawingml/2006/main" xmlns:r="http://schemas.openxmlformats.org/officeDocument/2006/relationships" xmlns:p="http://schemas.openxmlformats.org/presentationml/2006/main">
+  <p:cSld>
+    <p:spTree>
+      <p:nvGrpSpPr>
+        <p:cNvPr id="1" name=""/>
+        <p:cNvGrpSpPr/>
+        <p:nvPr/>
+      </p:nvGrpSpPr>
+      <p:grpSpPr>
+        <a:xfrm>
+          <a:off x="0" y="0"/>
+          <a:ext cx="0" cy="0"/>
+          <a:chOff x="0" y="0"/>
+          <a:chExt cx="0" cy="0"/>
+        </a:xfrm>
+      </p:grpSpPr>
+      <p:sp>
+        <p:nvSpPr>
+          <p:cNvPr id="2" name="제목 1"/>
+          <p:cNvSpPr>
+            <a:spLocks noGrp="1"/>
+          </p:cNvSpPr>
+          <p:nvPr>
+            <p:ph type="title"/>
+          </p:nvPr>
+        </p:nvSpPr>
+        <p:spPr/>
+        <p:txBody>
+          <a:bodyPr/>
+          <a:lstStyle/>
+          <a:p>
+            <a:r>
+              <a:rPr lang="en-US" altLang="ko-KR" dirty="0" smtClean="0"/>
+              <a:t>Binary classification models</a:t>
+            </a:r>
+            <a:endParaRPr lang="ko-KR" altLang="en-US" dirty="0"/>
+          </a:p>
+        </p:txBody>
+      </p:sp>
+      <p:sp>
+        <p:nvSpPr>
+          <p:cNvPr id="3" name="내용 개체 틀 2"/>
+          <p:cNvSpPr>
+            <a:spLocks noGrp="1"/>
+          </p:cNvSpPr>
+          <p:nvPr>
+            <p:ph idx="1"/>
+          </p:nvPr>
+        </p:nvSpPr>
+        <p:spPr/>
+        <p:txBody>
+          <a:bodyPr>
+            <a:normAutofit/>
+          </a:bodyPr>
+          <a:lstStyle/>
+          <a:p>
+            <a:r>
+              <a:rPr lang="en-US" altLang="ko-KR" dirty="0" smtClean="0"/>
+              <a:t>Both RF and SVM can calculate the probabilities of classifications, and rankings can be derived from the probability calculations.</a:t>
+            </a:r>
+          </a:p>
+          <a:p>
+            <a:endParaRPr lang="en-US" altLang="ko-KR" dirty="0" smtClean="0"/>
+          </a:p>
+          <a:p>
+            <a:r>
+              <a:rPr lang="en-US" altLang="ko-KR" dirty="0" smtClean="0"/>
+              <a:t>The predictive performance on rankings was evaluated by AUCROC, AUCPR</a:t>
+            </a:r>
+          </a:p>
+          <a:p>
+            <a:endParaRPr lang="en-US" altLang="ko-KR" dirty="0" smtClean="0"/>
+          </a:p>
+          <a:p>
+            <a:r>
+              <a:rPr lang="en-US" altLang="ko-KR" dirty="0" smtClean="0"/>
+              <a:t>AUCROC, AUCPR are in R package ‘Miscellaneous Esoteric Statistical Scripts’</a:t>
+            </a:r>
+            <a:endParaRPr lang="en-US" altLang="ko-KR" dirty="0"/>
+          </a:p>
+        </p:txBody>
+      </p:sp>
+    </p:spTree>
+    <p:extLst>
+      <p:ext uri="{BB962C8B-B14F-4D97-AF65-F5344CB8AC3E}">
+        <p14:creationId xmlns:p14="http://schemas.microsoft.com/office/powerpoint/2010/main" val="454141493"/>
+      </p:ext>
+    </p:extLst>
+  </p:cSld>
+  <p:clrMapOvr>
+    <a:masterClrMapping/>
+  </p:clrMapOvr>
+  <p:timing>
+    <p:tnLst>
+      <p:par>
+        <p:cTn id="1" dur="indefinite" restart="never" nodeType="tmRoot"/>
+      </p:par>
+    </p:tnLst>
+  </p:timing>
+</p:sld>
+</file>
+
+<file path=ppt/slides/slide21.xml><?xml version="1.0" encoding="utf-8"?>
+<p:sld xmlns:a="http://schemas.openxmlformats.org/drawingml/2006/main" xmlns:r="http://schemas.openxmlformats.org/officeDocument/2006/relationships" xmlns:p="http://schemas.openxmlformats.org/presentationml/2006/main">
+  <p:cSld>
+    <p:spTree>
+      <p:nvGrpSpPr>
+        <p:cNvPr id="1" name=""/>
+        <p:cNvGrpSpPr/>
+        <p:nvPr/>
+      </p:nvGrpSpPr>
+      <p:grpSpPr>
+        <a:xfrm>
+          <a:off x="0" y="0"/>
+          <a:ext cx="0" cy="0"/>
+          <a:chOff x="0" y="0"/>
+          <a:chExt cx="0" cy="0"/>
+        </a:xfrm>
+      </p:grpSpPr>
+      <p:sp>
+        <p:nvSpPr>
+          <p:cNvPr id="2" name="제목 1"/>
+          <p:cNvSpPr>
+            <a:spLocks noGrp="1"/>
+          </p:cNvSpPr>
+          <p:nvPr>
+            <p:ph type="title"/>
+          </p:nvPr>
+        </p:nvSpPr>
+        <p:spPr/>
+        <p:txBody>
+          <a:bodyPr/>
+          <a:lstStyle/>
+          <a:p>
+            <a:r>
+              <a:rPr lang="en-US" altLang="ko-KR" dirty="0" smtClean="0"/>
+              <a:t>Binary classification models</a:t>
+            </a:r>
+            <a:endParaRPr lang="ko-KR" altLang="en-US" dirty="0"/>
+          </a:p>
+        </p:txBody>
+      </p:sp>
+      <p:sp>
+        <p:nvSpPr>
+          <p:cNvPr id="4" name="내용 개체 틀 3"/>
+          <p:cNvSpPr>
+            <a:spLocks noGrp="1"/>
+          </p:cNvSpPr>
+          <p:nvPr>
+            <p:ph idx="1"/>
+          </p:nvPr>
+        </p:nvSpPr>
+        <p:spPr/>
+        <p:txBody>
+          <a:bodyPr/>
+          <a:lstStyle/>
+          <a:p>
+            <a:endParaRPr lang="ko-KR" altLang="en-US" dirty="0"/>
+          </a:p>
+        </p:txBody>
+      </p:sp>
+      <p:pic>
+        <p:nvPicPr>
+          <p:cNvPr id="7170" name="Picture 2" descr="C:\Users\MYCOM\Desktop\제목 없음.png"/>
+          <p:cNvPicPr>
+            <a:picLocks noChangeAspect="1" noChangeArrowheads="1"/>
+          </p:cNvPicPr>
+          <p:nvPr/>
+        </p:nvPicPr>
+        <p:blipFill>
+          <a:blip r:embed="rId2">
+            <a:extLst>
+              <a:ext uri="{28A0092B-C50C-407E-A947-70E740481C1C}">
+                <a14:useLocalDpi xmlns:a14="http://schemas.microsoft.com/office/drawing/2010/main" val="0"/>
+              </a:ext>
+            </a:extLst>
+          </a:blip>
+          <a:srcRect/>
+          <a:stretch>
+            <a:fillRect/>
+          </a:stretch>
+        </p:blipFill>
+        <p:spPr bwMode="auto">
+          <a:xfrm>
+            <a:off x="1182460" y="1455763"/>
+            <a:ext cx="6916511" cy="5174995"/>
+          </a:xfrm>
+          <a:prstGeom prst="rect">
+            <a:avLst/>
+          </a:prstGeom>
+          <a:noFill/>
+          <a:extLst>
+            <a:ext uri="{909E8E84-426E-40DD-AFC4-6F175D3DCCD1}">
+              <a14:hiddenFill xmlns:a14="http://schemas.microsoft.com/office/drawing/2010/main">
+                <a:solidFill>
+                  <a:srgbClr val="FFFFFF"/>
+                </a:solidFill>
+              </a14:hiddenFill>
+            </a:ext>
+          </a:extLst>
+        </p:spPr>
+      </p:pic>
+    </p:spTree>
+    <p:extLst>
+      <p:ext uri="{BB962C8B-B14F-4D97-AF65-F5344CB8AC3E}">
+        <p14:creationId xmlns:p14="http://schemas.microsoft.com/office/powerpoint/2010/main" val="3499651948"/>
+      </p:ext>
+    </p:extLst>
+  </p:cSld>
+  <p:clrMapOvr>
+    <a:masterClrMapping/>
+  </p:clrMapOvr>
+  <p:timing>
+    <p:tnLst>
+      <p:par>
+        <p:cTn id="1" dur="indefinite" restart="never" nodeType="tmRoot"/>
+      </p:par>
+    </p:tnLst>
+  </p:timing>
+</p:sld>
+</file>
+
+<file path=ppt/slides/slide3.xml><?xml version="1.0" encoding="utf-8"?>
+<p:sld xmlns:a="http://schemas.openxmlformats.org/drawingml/2006/main" xmlns:r="http://schemas.openxmlformats.org/officeDocument/2006/relationships" xmlns:p="http://schemas.openxmlformats.org/presentationml/2006/main">
+  <p:cSld>
+    <p:spTree>
+      <p:nvGrpSpPr>
+        <p:cNvPr id="1" name=""/>
+        <p:cNvGrpSpPr/>
+        <p:nvPr/>
+      </p:nvGrpSpPr>
+      <p:grpSpPr>
+        <a:xfrm>
+          <a:off x="0" y="0"/>
+          <a:ext cx="0" cy="0"/>
+          <a:chOff x="0" y="0"/>
+          <a:chExt cx="0" cy="0"/>
+        </a:xfrm>
+      </p:grpSpPr>
+      <p:sp>
+        <p:nvSpPr>
+          <p:cNvPr id="2" name="제목 1"/>
+          <p:cNvSpPr>
+            <a:spLocks noGrp="1"/>
+          </p:cNvSpPr>
+          <p:nvPr>
+            <p:ph type="title"/>
+          </p:nvPr>
+        </p:nvSpPr>
+        <p:spPr/>
+        <p:txBody>
+          <a:bodyPr/>
+          <a:lstStyle/>
+          <a:p>
+            <a:r>
+              <a:rPr lang="en-US" altLang="ko-KR" dirty="0" smtClean="0"/>
+              <a:t>Background</a:t>
+            </a:r>
+            <a:endParaRPr lang="ko-KR" altLang="en-US" dirty="0"/>
+          </a:p>
+        </p:txBody>
+      </p:sp>
+      <p:sp>
+        <p:nvSpPr>
+          <p:cNvPr id="3" name="내용 개체 틀 2"/>
+          <p:cNvSpPr>
+            <a:spLocks noGrp="1"/>
+          </p:cNvSpPr>
+          <p:nvPr>
+            <p:ph idx="1"/>
+          </p:nvPr>
+        </p:nvSpPr>
+        <p:spPr/>
+        <p:txBody>
+          <a:bodyPr>
+            <a:normAutofit fontScale="77500" lnSpcReduction="20000"/>
+          </a:bodyPr>
+          <a:lstStyle/>
+          <a:p>
+            <a:r>
+              <a:rPr lang="en-US" altLang="ko-KR" dirty="0" smtClean="0"/>
+              <a:t>However, Predicting DTI is equivalent to link prediction, which is a fundamental problem and long-standing challenge in complex network analysis.</a:t>
+            </a:r>
+          </a:p>
+          <a:p>
+            <a:endParaRPr lang="en-US" altLang="ko-KR" dirty="0" smtClean="0"/>
+          </a:p>
+          <a:p>
+            <a:r>
+              <a:rPr lang="en-US" altLang="ko-KR" dirty="0" smtClean="0"/>
+              <a:t>In drug-discovery, biological networks can be leveraged to identify potential associations between compounds and protein target.</a:t>
+            </a:r>
+          </a:p>
+          <a:p>
+            <a:endParaRPr lang="en-US" altLang="ko-KR" dirty="0" smtClean="0"/>
+          </a:p>
+          <a:p>
+            <a:r>
+              <a:rPr lang="en-US" altLang="ko-KR" dirty="0" smtClean="0"/>
+              <a:t>Typical network-based DTI predictions</a:t>
+            </a:r>
+          </a:p>
+          <a:p>
+            <a:pPr lvl="1"/>
+            <a:r>
+              <a:rPr lang="en-US" altLang="ko-KR" dirty="0" smtClean="0"/>
+              <a:t>1. based on similarity profiles calculated from common neighbors or direct connections</a:t>
+            </a:r>
+          </a:p>
+          <a:p>
+            <a:pPr lvl="1"/>
+            <a:r>
+              <a:rPr lang="en-US" altLang="ko-KR" dirty="0" smtClean="0"/>
+              <a:t>2. limited to bipartite networks.</a:t>
+            </a:r>
+          </a:p>
+          <a:p>
+            <a:pPr lvl="1"/>
+            <a:r>
+              <a:rPr lang="en-US" altLang="ko-KR" dirty="0" smtClean="0"/>
+              <a:t>3. But, only for homogeneous, not heterogeneous type and relations.</a:t>
+            </a:r>
+          </a:p>
+          <a:p>
+            <a:pPr marL="457200" lvl="1" indent="0">
+              <a:buNone/>
+            </a:pPr>
+            <a:endParaRPr lang="en-US" altLang="ko-KR" dirty="0"/>
+          </a:p>
+          <a:p>
+            <a:r>
+              <a:rPr lang="en-US" altLang="ko-KR" dirty="0" smtClean="0"/>
+              <a:t>Therefore, for link prediction, incorporated meta-path topological features.</a:t>
+            </a:r>
+          </a:p>
+        </p:txBody>
+      </p:sp>
+    </p:spTree>
+    <p:extLst>
+      <p:ext uri="{BB962C8B-B14F-4D97-AF65-F5344CB8AC3E}">
+        <p14:creationId xmlns:p14="http://schemas.microsoft.com/office/powerpoint/2010/main" val="867943064"/>
+      </p:ext>
+    </p:extLst>
+  </p:cSld>
+  <p:clrMapOvr>
+    <a:masterClrMapping/>
+  </p:clrMapOvr>
+  <p:timing>
+    <p:tnLst>
+      <p:par>
+        <p:cTn id="1" dur="indefinite" restart="never" nodeType="tmRoot"/>
+      </p:par>
+    </p:tnLst>
+  </p:timing>
+</p:sld>
+</file>
+
+<file path=ppt/slides/slide4.xml><?xml version="1.0" encoding="utf-8"?>
+<p:sld xmlns:a="http://schemas.openxmlformats.org/drawingml/2006/main" xmlns:r="http://schemas.openxmlformats.org/officeDocument/2006/relationships" xmlns:p="http://schemas.openxmlformats.org/presentationml/2006/main">
+  <p:cSld>
+    <p:spTree>
+      <p:nvGrpSpPr>
+        <p:cNvPr id="1" name=""/>
+        <p:cNvGrpSpPr/>
+        <p:nvPr/>
+      </p:nvGrpSpPr>
+      <p:grpSpPr>
+        <a:xfrm>
+          <a:off x="0" y="0"/>
+          <a:ext cx="0" cy="0"/>
+          <a:chOff x="0" y="0"/>
+          <a:chExt cx="0" cy="0"/>
+        </a:xfrm>
+      </p:grpSpPr>
+      <p:sp>
+        <p:nvSpPr>
+          <p:cNvPr id="2" name="제목 1"/>
+          <p:cNvSpPr>
+            <a:spLocks noGrp="1"/>
+          </p:cNvSpPr>
+          <p:nvPr>
+            <p:ph type="title"/>
+          </p:nvPr>
+        </p:nvSpPr>
+        <p:spPr/>
+        <p:txBody>
+          <a:bodyPr/>
+          <a:lstStyle/>
+          <a:p>
+            <a:r>
+              <a:rPr lang="en-US" altLang="ko-KR" dirty="0" smtClean="0"/>
+              <a:t>A meta-path</a:t>
+            </a:r>
+            <a:endParaRPr lang="ko-KR" altLang="en-US" dirty="0"/>
+          </a:p>
+        </p:txBody>
+      </p:sp>
+      <p:sp>
+        <p:nvSpPr>
+          <p:cNvPr id="3" name="내용 개체 틀 2"/>
+          <p:cNvSpPr>
+            <a:spLocks noGrp="1"/>
+          </p:cNvSpPr>
+          <p:nvPr>
+            <p:ph idx="1"/>
+          </p:nvPr>
+        </p:nvSpPr>
+        <p:spPr/>
+        <p:txBody>
+          <a:bodyPr>
+            <a:normAutofit/>
+          </a:bodyPr>
+          <a:lstStyle/>
+          <a:p>
+            <a:r>
+              <a:rPr lang="en-US" altLang="ko-KR" dirty="0" smtClean="0"/>
+              <a:t>A meta-path defines a certain type of paths linking the starting and ending objects.</a:t>
+            </a:r>
+          </a:p>
+          <a:p>
+            <a:endParaRPr lang="en-US" altLang="ko-KR" dirty="0"/>
+          </a:p>
+          <a:p>
+            <a:r>
+              <a:rPr lang="en-US" altLang="ko-KR" dirty="0" smtClean="0"/>
+              <a:t>Path Count : The total number of paths belonging to a specific meta-path is an important topological feature to evaluate the strength of associations.</a:t>
+            </a:r>
+          </a:p>
+          <a:p>
+            <a:endParaRPr lang="en-US" altLang="ko-KR" dirty="0" smtClean="0"/>
+          </a:p>
+          <a:p>
+            <a:pPr marL="0" indent="0">
+              <a:buNone/>
+            </a:pPr>
+            <a:endParaRPr lang="en-US" altLang="ko-KR" dirty="0" smtClean="0"/>
+          </a:p>
+        </p:txBody>
+      </p:sp>
+      <p:pic>
+        <p:nvPicPr>
+          <p:cNvPr id="9218" name="Picture 2" descr="C:\Users\MYCOM\Desktop\제목 없음.png"/>
+          <p:cNvPicPr>
+            <a:picLocks noChangeAspect="1" noChangeArrowheads="1"/>
+          </p:cNvPicPr>
+          <p:nvPr/>
+        </p:nvPicPr>
+        <p:blipFill>
+          <a:blip r:embed="rId2">
+            <a:extLst>
+              <a:ext uri="{28A0092B-C50C-407E-A947-70E740481C1C}">
+                <a14:useLocalDpi xmlns:a14="http://schemas.microsoft.com/office/drawing/2010/main" val="0"/>
+              </a:ext>
+            </a:extLst>
+          </a:blip>
+          <a:srcRect/>
+          <a:stretch>
+            <a:fillRect/>
+          </a:stretch>
+        </p:blipFill>
+        <p:spPr bwMode="auto">
+          <a:xfrm>
+            <a:off x="1216251" y="4923518"/>
+            <a:ext cx="9059863" cy="1193855"/>
+          </a:xfrm>
+          <a:prstGeom prst="rect">
+            <a:avLst/>
+          </a:prstGeom>
+          <a:noFill/>
+          <a:extLst>
+            <a:ext uri="{909E8E84-426E-40DD-AFC4-6F175D3DCCD1}">
+              <a14:hiddenFill xmlns:a14="http://schemas.microsoft.com/office/drawing/2010/main">
+                <a:solidFill>
+                  <a:srgbClr val="FFFFFF"/>
+                </a:solidFill>
+              </a14:hiddenFill>
+            </a:ext>
+          </a:extLst>
+        </p:spPr>
+      </p:pic>
+    </p:spTree>
+    <p:extLst>
+      <p:ext uri="{BB962C8B-B14F-4D97-AF65-F5344CB8AC3E}">
+        <p14:creationId xmlns:p14="http://schemas.microsoft.com/office/powerpoint/2010/main" val="3035554642"/>
+      </p:ext>
+    </p:extLst>
+  </p:cSld>
+  <p:clrMapOvr>
+    <a:masterClrMapping/>
+  </p:clrMapOvr>
+  <p:timing>
+    <p:tnLst>
+      <p:par>
+        <p:cTn id="1" dur="indefinite" restart="never" nodeType="tmRoot"/>
+      </p:par>
+    </p:tnLst>
+  </p:timing>
+</p:sld>
+</file>
+
+<file path=ppt/slides/slide5.xml><?xml version="1.0" encoding="utf-8"?>
+<p:sld xmlns:a="http://schemas.openxmlformats.org/drawingml/2006/main" xmlns:r="http://schemas.openxmlformats.org/officeDocument/2006/relationships" xmlns:p="http://schemas.openxmlformats.org/presentationml/2006/main">
+  <p:cSld>
+    <p:spTree>
+      <p:nvGrpSpPr>
+        <p:cNvPr id="1" name=""/>
+        <p:cNvGrpSpPr/>
+        <p:nvPr/>
+      </p:nvGrpSpPr>
+      <p:grpSpPr>
+        <a:xfrm>
+          <a:off x="0" y="0"/>
+          <a:ext cx="0" cy="0"/>
+          <a:chOff x="0" y="0"/>
+          <a:chExt cx="0" cy="0"/>
+        </a:xfrm>
+      </p:grpSpPr>
+      <p:sp>
+        <p:nvSpPr>
+          <p:cNvPr id="2" name="제목 1"/>
+          <p:cNvSpPr>
+            <a:spLocks noGrp="1"/>
+          </p:cNvSpPr>
+          <p:nvPr>
+            <p:ph type="title"/>
+          </p:nvPr>
+        </p:nvSpPr>
+        <p:spPr/>
+        <p:txBody>
+          <a:bodyPr/>
+          <a:lstStyle/>
+          <a:p>
+            <a:r>
+              <a:rPr lang="en-US" altLang="ko-KR" dirty="0" smtClean="0"/>
+              <a:t>What is differences between SLAP and this approach</a:t>
+            </a:r>
+            <a:endParaRPr lang="ko-KR" altLang="en-US" dirty="0"/>
+          </a:p>
+        </p:txBody>
+      </p:sp>
+      <p:sp>
+        <p:nvSpPr>
+          <p:cNvPr id="3" name="내용 개체 틀 2"/>
+          <p:cNvSpPr>
+            <a:spLocks noGrp="1"/>
+          </p:cNvSpPr>
+          <p:nvPr>
+            <p:ph idx="1"/>
+          </p:nvPr>
+        </p:nvSpPr>
+        <p:spPr/>
+        <p:txBody>
+          <a:bodyPr>
+            <a:normAutofit fontScale="55000" lnSpcReduction="20000"/>
+          </a:bodyPr>
+          <a:lstStyle/>
+          <a:p>
+            <a:r>
+              <a:rPr lang="en-US" altLang="ko-KR" dirty="0" smtClean="0"/>
+              <a:t>Meta-path approach provides an alternative DTI approach to SLAP</a:t>
+            </a:r>
+          </a:p>
+          <a:p>
+            <a:endParaRPr lang="en-US" altLang="ko-KR" dirty="0" smtClean="0"/>
+          </a:p>
+          <a:p>
+            <a:r>
+              <a:rPr lang="en-US" altLang="ko-KR" dirty="0" smtClean="0"/>
+              <a:t>Rather than using a statistical model  to study the significance of meta-path topological features, we propose a framework to take advantage of machine learning algorithms.</a:t>
+            </a:r>
+          </a:p>
+          <a:p>
+            <a:pPr lvl="1"/>
+            <a:r>
+              <a:rPr lang="en-US" altLang="ko-KR" dirty="0"/>
+              <a:t> </a:t>
+            </a:r>
+            <a:r>
+              <a:rPr lang="en-US" altLang="ko-KR" dirty="0" smtClean="0"/>
+              <a:t>ex) Random Forest, SVM</a:t>
+            </a:r>
+          </a:p>
+          <a:p>
+            <a:pPr lvl="1"/>
+            <a:endParaRPr lang="en-US" altLang="ko-KR" dirty="0" smtClean="0"/>
+          </a:p>
+          <a:p>
+            <a:r>
+              <a:rPr lang="en-US" altLang="ko-KR" dirty="0" smtClean="0"/>
+              <a:t>A more complete drug-target connectivity map can be constructed using the predicted links.</a:t>
+            </a:r>
+          </a:p>
+          <a:p>
+            <a:endParaRPr lang="en-US" altLang="ko-KR" dirty="0"/>
+          </a:p>
+          <a:p>
+            <a:r>
+              <a:rPr lang="en-US" altLang="ko-KR" dirty="0" smtClean="0"/>
+              <a:t>Feature importance can be calculated at the same time as the classification models are built.</a:t>
+            </a:r>
+          </a:p>
+          <a:p>
+            <a:endParaRPr lang="en-US" altLang="ko-KR" dirty="0" smtClean="0"/>
+          </a:p>
+          <a:p>
+            <a:r>
+              <a:rPr lang="en-US" altLang="ko-KR" dirty="0" smtClean="0"/>
+              <a:t>SLAP only consider path counts, but this approach can apply different kinds of normalization processes to pc.</a:t>
+            </a:r>
+            <a:endParaRPr lang="en-US" altLang="ko-KR" dirty="0"/>
+          </a:p>
+          <a:p>
+            <a:pPr lvl="1"/>
+            <a:r>
+              <a:rPr lang="en-US" altLang="ko-KR" dirty="0" smtClean="0"/>
+              <a:t> Ex) random walk, normalized path count, and symmetric random walk</a:t>
+            </a:r>
+          </a:p>
+          <a:p>
+            <a:endParaRPr lang="en-US" altLang="ko-KR" dirty="0" smtClean="0"/>
+          </a:p>
+          <a:p>
+            <a:r>
+              <a:rPr lang="en-US" altLang="ko-KR" dirty="0" smtClean="0"/>
+              <a:t>In order to compare this approach with SLAP, we have carried out link prediction experiment on Chem2Bio2RDF..</a:t>
+            </a:r>
+          </a:p>
+          <a:p>
+            <a:endParaRPr lang="en-US" altLang="ko-KR" dirty="0"/>
+          </a:p>
+          <a:p>
+            <a:r>
+              <a:rPr lang="en-US" altLang="ko-KR" dirty="0" smtClean="0"/>
+              <a:t>This approach can be generalized as a framework to leverage machine learning algorithms to study the topological features of the heterogeneous network for link prediction.</a:t>
+            </a:r>
+            <a:endParaRPr lang="en-US" altLang="ko-KR" dirty="0"/>
+          </a:p>
+          <a:p>
+            <a:pPr marL="0" indent="0">
+              <a:buNone/>
+            </a:pPr>
+            <a:endParaRPr lang="en-US" altLang="ko-KR" dirty="0" smtClean="0"/>
+          </a:p>
+        </p:txBody>
+      </p:sp>
+    </p:spTree>
+    <p:extLst>
+      <p:ext uri="{BB962C8B-B14F-4D97-AF65-F5344CB8AC3E}">
+        <p14:creationId xmlns:p14="http://schemas.microsoft.com/office/powerpoint/2010/main" val="1429243762"/>
+      </p:ext>
+    </p:extLst>
+  </p:cSld>
+  <p:clrMapOvr>
+    <a:masterClrMapping/>
+  </p:clrMapOvr>
+</p:sld>
+</file>
+
+<file path=ppt/slides/slide6.xml><?xml version="1.0" encoding="utf-8"?>
+<p:sld xmlns:a="http://schemas.openxmlformats.org/drawingml/2006/main" xmlns:r="http://schemas.openxmlformats.org/officeDocument/2006/relationships" xmlns:p="http://schemas.openxmlformats.org/presentationml/2006/main">
+  <p:cSld>
+    <p:spTree>
+      <p:nvGrpSpPr>
+        <p:cNvPr id="1" name=""/>
+        <p:cNvGrpSpPr/>
+        <p:nvPr/>
+      </p:nvGrpSpPr>
+      <p:grpSpPr>
+        <a:xfrm>
+          <a:off x="0" y="0"/>
+          <a:ext cx="0" cy="0"/>
+          <a:chOff x="0" y="0"/>
+          <a:chExt cx="0" cy="0"/>
+        </a:xfrm>
+      </p:grpSpPr>
+      <p:sp>
+        <p:nvSpPr>
+          <p:cNvPr id="2" name="제목 1"/>
+          <p:cNvSpPr>
+            <a:spLocks noGrp="1"/>
+          </p:cNvSpPr>
+          <p:nvPr>
+            <p:ph type="title"/>
+          </p:nvPr>
+        </p:nvSpPr>
+        <p:spPr/>
+        <p:txBody>
+          <a:bodyPr/>
+          <a:lstStyle/>
+          <a:p>
+            <a:r>
+              <a:rPr lang="en-US" altLang="ko-KR" dirty="0" smtClean="0"/>
+              <a:t>Semantic network</a:t>
+            </a:r>
+            <a:endParaRPr lang="ko-KR" altLang="en-US" dirty="0"/>
+          </a:p>
+        </p:txBody>
+      </p:sp>
+      <p:sp>
+        <p:nvSpPr>
+          <p:cNvPr id="3" name="내용 개체 틀 2"/>
+          <p:cNvSpPr>
+            <a:spLocks noGrp="1"/>
+          </p:cNvSpPr>
+          <p:nvPr>
+            <p:ph idx="1"/>
+          </p:nvPr>
+        </p:nvSpPr>
+        <p:spPr/>
+        <p:txBody>
+          <a:bodyPr>
+            <a:normAutofit/>
+          </a:bodyPr>
+          <a:lstStyle/>
+          <a:p>
+            <a:r>
+              <a:rPr lang="en-US" altLang="ko-KR" dirty="0" smtClean="0"/>
+              <a:t>In the Chem2Bio2RDF semantic network, there are 9 semantic types, 10 semantic links and 2 more similarity.</a:t>
+            </a:r>
+          </a:p>
+          <a:p>
+            <a:endParaRPr lang="en-US" altLang="ko-KR" dirty="0"/>
+          </a:p>
+        </p:txBody>
+      </p:sp>
+      <p:sp>
+        <p:nvSpPr>
+          <p:cNvPr id="5" name="TextBox 4"/>
+          <p:cNvSpPr txBox="1"/>
+          <p:nvPr/>
+        </p:nvSpPr>
+        <p:spPr>
+          <a:xfrm>
+            <a:off x="1158240" y="2779193"/>
+            <a:ext cx="3576300" cy="3139321"/>
+          </a:xfrm>
+          <a:prstGeom prst="rect">
+            <a:avLst/>
+          </a:prstGeom>
+          <a:noFill/>
+        </p:spPr>
+        <p:txBody>
+          <a:bodyPr wrap="none" rtlCol="0">
+            <a:spAutoFit/>
+          </a:bodyPr>
+          <a:lstStyle/>
+          <a:p>
+            <a:r>
+              <a:rPr lang="en-US" altLang="ko-KR" b="1" dirty="0" smtClean="0"/>
+              <a:t>9 sematic </a:t>
+            </a:r>
+            <a:r>
+              <a:rPr lang="en-US" altLang="ko-KR" b="1" dirty="0"/>
+              <a:t>types</a:t>
+            </a:r>
+          </a:p>
+          <a:p>
+            <a:r>
+              <a:rPr lang="en-US" altLang="ko-KR" dirty="0" smtClean="0"/>
+              <a:t>Compounds</a:t>
+            </a:r>
+          </a:p>
+          <a:p>
+            <a:r>
+              <a:rPr lang="en-US" altLang="ko-KR" dirty="0" smtClean="0"/>
+              <a:t>Proteins</a:t>
+            </a:r>
+          </a:p>
+          <a:p>
+            <a:r>
+              <a:rPr lang="en-US" altLang="ko-KR" dirty="0" smtClean="0"/>
+              <a:t>adverse </a:t>
+            </a:r>
+            <a:r>
+              <a:rPr lang="en-US" altLang="ko-KR" dirty="0"/>
+              <a:t>side </a:t>
+            </a:r>
+            <a:r>
+              <a:rPr lang="en-US" altLang="ko-KR" dirty="0" smtClean="0"/>
+              <a:t>effects</a:t>
+            </a:r>
+          </a:p>
+          <a:p>
+            <a:r>
+              <a:rPr lang="en-US" altLang="ko-KR" dirty="0" smtClean="0"/>
+              <a:t>Gene </a:t>
+            </a:r>
+            <a:r>
+              <a:rPr lang="en-US" altLang="ko-KR" dirty="0"/>
+              <a:t>Ontology (</a:t>
+            </a:r>
+            <a:r>
+              <a:rPr lang="en-US" altLang="ko-KR" dirty="0" smtClean="0"/>
+              <a:t>GO)annotations</a:t>
+            </a:r>
+          </a:p>
+          <a:p>
+            <a:r>
+              <a:rPr lang="fr-FR" altLang="ko-KR" dirty="0" smtClean="0"/>
+              <a:t>ChEBI types</a:t>
+            </a:r>
+          </a:p>
+          <a:p>
+            <a:r>
+              <a:rPr lang="fr-FR" altLang="ko-KR" dirty="0" smtClean="0"/>
+              <a:t>Substructures</a:t>
+            </a:r>
+          </a:p>
+          <a:p>
+            <a:r>
+              <a:rPr lang="fr-FR" altLang="ko-KR" dirty="0" smtClean="0"/>
+              <a:t>Tissues</a:t>
+            </a:r>
+          </a:p>
+          <a:p>
+            <a:r>
+              <a:rPr lang="fr-FR" altLang="ko-KR" dirty="0" smtClean="0"/>
+              <a:t>biological </a:t>
+            </a:r>
+            <a:r>
+              <a:rPr lang="en-US" altLang="ko-KR" dirty="0" smtClean="0"/>
+              <a:t>pathways</a:t>
+            </a:r>
+          </a:p>
+          <a:p>
+            <a:r>
+              <a:rPr lang="en-US" altLang="ko-KR" dirty="0" smtClean="0"/>
+              <a:t>diseases</a:t>
+            </a:r>
+            <a:endParaRPr lang="en-US" altLang="ko-KR" dirty="0"/>
+          </a:p>
+          <a:p>
+            <a:endParaRPr lang="ko-KR" altLang="en-US" dirty="0"/>
+          </a:p>
+        </p:txBody>
+      </p:sp>
+      <p:sp>
+        <p:nvSpPr>
+          <p:cNvPr id="6" name="TextBox 5"/>
+          <p:cNvSpPr txBox="1"/>
+          <p:nvPr/>
+        </p:nvSpPr>
+        <p:spPr>
+          <a:xfrm>
+            <a:off x="4998720" y="2779193"/>
+            <a:ext cx="4435638" cy="3139321"/>
+          </a:xfrm>
+          <a:prstGeom prst="rect">
+            <a:avLst/>
+          </a:prstGeom>
+          <a:noFill/>
+        </p:spPr>
+        <p:txBody>
+          <a:bodyPr wrap="none" rtlCol="0">
+            <a:spAutoFit/>
+          </a:bodyPr>
+          <a:lstStyle/>
+          <a:p>
+            <a:r>
+              <a:rPr lang="en-US" altLang="ko-KR" b="1" dirty="0" smtClean="0"/>
+              <a:t>10 </a:t>
+            </a:r>
+            <a:r>
+              <a:rPr lang="en-US" altLang="ko-KR" b="1" dirty="0"/>
+              <a:t>different semantic links </a:t>
+            </a:r>
+          </a:p>
+          <a:p>
+            <a:r>
+              <a:rPr lang="en-US" altLang="ko-KR" dirty="0">
+                <a:solidFill>
+                  <a:schemeClr val="bg2">
+                    <a:lumMod val="75000"/>
+                  </a:schemeClr>
+                </a:solidFill>
+              </a:rPr>
+              <a:t>from </a:t>
+            </a:r>
+            <a:r>
+              <a:rPr lang="en-US" altLang="ko-KR" dirty="0"/>
+              <a:t>compounds </a:t>
+            </a:r>
+            <a:r>
+              <a:rPr lang="en-US" altLang="ko-KR" dirty="0">
+                <a:solidFill>
+                  <a:schemeClr val="bg2">
+                    <a:lumMod val="75000"/>
+                  </a:schemeClr>
+                </a:solidFill>
+              </a:rPr>
+              <a:t>to</a:t>
+            </a:r>
+            <a:r>
+              <a:rPr lang="en-US" altLang="ko-KR" dirty="0"/>
+              <a:t> </a:t>
+            </a:r>
+            <a:r>
+              <a:rPr lang="en-US" altLang="ko-KR" dirty="0" err="1"/>
+              <a:t>ChEBI</a:t>
+            </a:r>
+            <a:r>
+              <a:rPr lang="en-US" altLang="ko-KR" dirty="0"/>
+              <a:t> </a:t>
+            </a:r>
+            <a:r>
+              <a:rPr lang="en-US" altLang="ko-KR" dirty="0" smtClean="0"/>
+              <a:t>types</a:t>
+            </a:r>
+          </a:p>
+          <a:p>
+            <a:r>
+              <a:rPr lang="en-US" altLang="ko-KR" dirty="0" smtClean="0">
+                <a:solidFill>
+                  <a:schemeClr val="bg2">
+                    <a:lumMod val="75000"/>
+                  </a:schemeClr>
+                </a:solidFill>
+              </a:rPr>
+              <a:t>from</a:t>
+            </a:r>
+            <a:r>
+              <a:rPr lang="en-US" altLang="ko-KR" dirty="0" smtClean="0"/>
+              <a:t> compounds </a:t>
+            </a:r>
+            <a:r>
+              <a:rPr lang="en-US" altLang="ko-KR" dirty="0" smtClean="0">
+                <a:solidFill>
+                  <a:schemeClr val="bg2">
+                    <a:lumMod val="75000"/>
+                  </a:schemeClr>
+                </a:solidFill>
+              </a:rPr>
+              <a:t>to</a:t>
+            </a:r>
+            <a:r>
+              <a:rPr lang="en-US" altLang="ko-KR" dirty="0" smtClean="0"/>
+              <a:t> proteins</a:t>
+            </a:r>
+          </a:p>
+          <a:p>
+            <a:r>
+              <a:rPr lang="en-US" altLang="ko-KR" dirty="0" smtClean="0">
+                <a:solidFill>
+                  <a:schemeClr val="bg2">
+                    <a:lumMod val="75000"/>
+                  </a:schemeClr>
+                </a:solidFill>
+              </a:rPr>
+              <a:t>from</a:t>
+            </a:r>
+            <a:r>
+              <a:rPr lang="en-US" altLang="ko-KR" dirty="0" smtClean="0"/>
+              <a:t> </a:t>
+            </a:r>
+            <a:r>
+              <a:rPr lang="en-US" altLang="ko-KR" dirty="0"/>
+              <a:t>compounds </a:t>
+            </a:r>
+            <a:r>
+              <a:rPr lang="en-US" altLang="ko-KR" dirty="0" smtClean="0">
+                <a:solidFill>
+                  <a:schemeClr val="bg2">
+                    <a:lumMod val="75000"/>
+                  </a:schemeClr>
+                </a:solidFill>
+              </a:rPr>
+              <a:t>to </a:t>
+            </a:r>
+            <a:r>
+              <a:rPr lang="en-US" altLang="ko-KR" dirty="0" smtClean="0"/>
+              <a:t>substructures</a:t>
+            </a:r>
+          </a:p>
+          <a:p>
+            <a:r>
+              <a:rPr lang="en-US" altLang="ko-KR" dirty="0" smtClean="0">
+                <a:solidFill>
+                  <a:schemeClr val="bg2">
+                    <a:lumMod val="75000"/>
+                  </a:schemeClr>
+                </a:solidFill>
+              </a:rPr>
+              <a:t>from</a:t>
+            </a:r>
+            <a:r>
+              <a:rPr lang="en-US" altLang="ko-KR" dirty="0" smtClean="0"/>
+              <a:t> </a:t>
+            </a:r>
+            <a:r>
+              <a:rPr lang="en-US" altLang="ko-KR" dirty="0"/>
+              <a:t>adverse side effects </a:t>
+            </a:r>
+            <a:r>
+              <a:rPr lang="en-US" altLang="ko-KR" dirty="0">
+                <a:solidFill>
+                  <a:schemeClr val="bg2">
+                    <a:lumMod val="75000"/>
+                  </a:schemeClr>
+                </a:solidFill>
+              </a:rPr>
+              <a:t>to</a:t>
+            </a:r>
+            <a:r>
+              <a:rPr lang="en-US" altLang="ko-KR" dirty="0"/>
+              <a:t> </a:t>
+            </a:r>
+            <a:r>
+              <a:rPr lang="en-US" altLang="ko-KR" dirty="0" smtClean="0"/>
+              <a:t>compounds</a:t>
+            </a:r>
+            <a:endParaRPr lang="en-US" altLang="ko-KR" dirty="0"/>
+          </a:p>
+          <a:p>
+            <a:r>
+              <a:rPr lang="en-US" altLang="ko-KR" dirty="0">
+                <a:solidFill>
+                  <a:schemeClr val="bg2">
+                    <a:lumMod val="75000"/>
+                  </a:schemeClr>
+                </a:solidFill>
+              </a:rPr>
+              <a:t>from</a:t>
+            </a:r>
+            <a:r>
+              <a:rPr lang="en-US" altLang="ko-KR" dirty="0"/>
+              <a:t> diseases </a:t>
+            </a:r>
+            <a:r>
+              <a:rPr lang="en-US" altLang="ko-KR" dirty="0">
+                <a:solidFill>
+                  <a:schemeClr val="bg2">
+                    <a:lumMod val="75000"/>
+                  </a:schemeClr>
+                </a:solidFill>
+              </a:rPr>
+              <a:t>to</a:t>
+            </a:r>
+            <a:r>
+              <a:rPr lang="en-US" altLang="ko-KR" dirty="0"/>
+              <a:t> </a:t>
+            </a:r>
+            <a:r>
+              <a:rPr lang="en-US" altLang="ko-KR" dirty="0" smtClean="0"/>
+              <a:t>compounds</a:t>
+            </a:r>
+          </a:p>
+          <a:p>
+            <a:r>
+              <a:rPr lang="en-US" altLang="ko-KR" dirty="0" smtClean="0">
+                <a:solidFill>
+                  <a:schemeClr val="bg2">
+                    <a:lumMod val="75000"/>
+                  </a:schemeClr>
+                </a:solidFill>
+              </a:rPr>
+              <a:t>from</a:t>
+            </a:r>
+            <a:r>
+              <a:rPr lang="en-US" altLang="ko-KR" dirty="0" smtClean="0"/>
+              <a:t> </a:t>
+            </a:r>
+            <a:r>
+              <a:rPr lang="en-US" altLang="ko-KR" dirty="0"/>
+              <a:t>proteins </a:t>
+            </a:r>
+            <a:r>
+              <a:rPr lang="en-US" altLang="ko-KR" dirty="0">
+                <a:solidFill>
+                  <a:schemeClr val="bg2">
+                    <a:lumMod val="75000"/>
+                  </a:schemeClr>
+                </a:solidFill>
+              </a:rPr>
+              <a:t>to</a:t>
+            </a:r>
+            <a:r>
+              <a:rPr lang="en-US" altLang="ko-KR" dirty="0"/>
+              <a:t> </a:t>
+            </a:r>
+            <a:r>
+              <a:rPr lang="en-US" altLang="ko-KR" dirty="0" smtClean="0"/>
+              <a:t>proteins</a:t>
+            </a:r>
+          </a:p>
+          <a:p>
+            <a:r>
+              <a:rPr lang="en-US" altLang="ko-KR" dirty="0" smtClean="0">
+                <a:solidFill>
+                  <a:schemeClr val="bg2">
+                    <a:lumMod val="75000"/>
+                  </a:schemeClr>
+                </a:solidFill>
+              </a:rPr>
+              <a:t>from</a:t>
+            </a:r>
+            <a:r>
+              <a:rPr lang="en-US" altLang="ko-KR" dirty="0" smtClean="0"/>
+              <a:t> </a:t>
+            </a:r>
+            <a:r>
+              <a:rPr lang="en-US" altLang="ko-KR" dirty="0"/>
+              <a:t>proteins </a:t>
+            </a:r>
+            <a:r>
+              <a:rPr lang="en-US" altLang="ko-KR" dirty="0">
+                <a:solidFill>
+                  <a:schemeClr val="bg2">
+                    <a:lumMod val="75000"/>
+                  </a:schemeClr>
+                </a:solidFill>
+              </a:rPr>
+              <a:t>to</a:t>
+            </a:r>
+            <a:r>
+              <a:rPr lang="en-US" altLang="ko-KR" dirty="0"/>
+              <a:t> GO </a:t>
+            </a:r>
+            <a:r>
+              <a:rPr lang="en-US" altLang="ko-KR" dirty="0" smtClean="0"/>
+              <a:t>annotations</a:t>
+            </a:r>
+          </a:p>
+          <a:p>
+            <a:r>
+              <a:rPr lang="en-US" altLang="ko-KR" dirty="0" smtClean="0">
+                <a:solidFill>
+                  <a:schemeClr val="bg2">
+                    <a:lumMod val="75000"/>
+                  </a:schemeClr>
+                </a:solidFill>
+              </a:rPr>
+              <a:t>from</a:t>
+            </a:r>
+            <a:r>
+              <a:rPr lang="en-US" altLang="ko-KR" dirty="0" smtClean="0"/>
+              <a:t> </a:t>
+            </a:r>
+            <a:r>
+              <a:rPr lang="en-US" altLang="ko-KR" dirty="0"/>
+              <a:t>diseases </a:t>
+            </a:r>
+            <a:r>
+              <a:rPr lang="en-US" altLang="ko-KR" dirty="0">
+                <a:solidFill>
+                  <a:schemeClr val="bg2">
+                    <a:lumMod val="75000"/>
+                  </a:schemeClr>
+                </a:solidFill>
+              </a:rPr>
+              <a:t>to</a:t>
+            </a:r>
+            <a:r>
+              <a:rPr lang="en-US" altLang="ko-KR" dirty="0"/>
+              <a:t> </a:t>
+            </a:r>
+            <a:r>
+              <a:rPr lang="en-US" altLang="ko-KR" dirty="0" smtClean="0"/>
+              <a:t>proteins</a:t>
+            </a:r>
+          </a:p>
+          <a:p>
+            <a:r>
+              <a:rPr lang="en-US" altLang="ko-KR" dirty="0" smtClean="0">
+                <a:solidFill>
+                  <a:schemeClr val="bg2">
+                    <a:lumMod val="75000"/>
+                  </a:schemeClr>
+                </a:solidFill>
+              </a:rPr>
+              <a:t>from </a:t>
+            </a:r>
+            <a:r>
+              <a:rPr lang="en-US" altLang="ko-KR" dirty="0" smtClean="0"/>
+              <a:t>pathways </a:t>
+            </a:r>
+            <a:r>
+              <a:rPr lang="en-US" altLang="ko-KR" dirty="0" smtClean="0">
+                <a:solidFill>
+                  <a:schemeClr val="bg2">
+                    <a:lumMod val="75000"/>
+                  </a:schemeClr>
+                </a:solidFill>
+              </a:rPr>
+              <a:t>to</a:t>
+            </a:r>
+            <a:r>
+              <a:rPr lang="en-US" altLang="ko-KR" dirty="0" smtClean="0"/>
+              <a:t> proteins</a:t>
+            </a:r>
+          </a:p>
+          <a:p>
+            <a:r>
+              <a:rPr lang="en-US" altLang="ko-KR" dirty="0" smtClean="0">
+                <a:solidFill>
+                  <a:schemeClr val="bg2">
+                    <a:lumMod val="75000"/>
+                  </a:schemeClr>
+                </a:solidFill>
+              </a:rPr>
+              <a:t>from</a:t>
+            </a:r>
+            <a:r>
+              <a:rPr lang="en-US" altLang="ko-KR" dirty="0" smtClean="0"/>
+              <a:t> </a:t>
+            </a:r>
+            <a:r>
+              <a:rPr lang="en-US" altLang="ko-KR" dirty="0"/>
+              <a:t>tissues </a:t>
+            </a:r>
+            <a:r>
+              <a:rPr lang="en-US" altLang="ko-KR" dirty="0">
+                <a:solidFill>
+                  <a:schemeClr val="bg2">
+                    <a:lumMod val="75000"/>
+                  </a:schemeClr>
+                </a:solidFill>
+              </a:rPr>
+              <a:t>to</a:t>
+            </a:r>
+            <a:r>
+              <a:rPr lang="en-US" altLang="ko-KR" dirty="0"/>
+              <a:t> proteins.</a:t>
+            </a:r>
+            <a:endParaRPr lang="ko-KR" altLang="en-US" dirty="0"/>
+          </a:p>
+        </p:txBody>
+      </p:sp>
+      <p:sp>
+        <p:nvSpPr>
+          <p:cNvPr id="7" name="TextBox 6"/>
+          <p:cNvSpPr txBox="1"/>
+          <p:nvPr/>
+        </p:nvSpPr>
+        <p:spPr>
+          <a:xfrm>
+            <a:off x="5193792" y="5903369"/>
+            <a:ext cx="6738127" cy="923330"/>
+          </a:xfrm>
+          <a:prstGeom prst="rect">
+            <a:avLst/>
+          </a:prstGeom>
+          <a:noFill/>
+        </p:spPr>
+        <p:txBody>
+          <a:bodyPr wrap="none" rtlCol="0">
+            <a:spAutoFit/>
+          </a:bodyPr>
+          <a:lstStyle/>
+          <a:p>
+            <a:r>
+              <a:rPr lang="en-US" altLang="ko-KR" b="1" dirty="0" smtClean="0"/>
+              <a:t>+ two more semantic links from </a:t>
+            </a:r>
+            <a:r>
+              <a:rPr lang="en-US" altLang="ko-KR" b="1" dirty="0" err="1" smtClean="0"/>
+              <a:t>PubChem</a:t>
+            </a:r>
+            <a:r>
+              <a:rPr lang="en-US" altLang="ko-KR" b="1" dirty="0" smtClean="0"/>
+              <a:t> : </a:t>
+            </a:r>
+          </a:p>
+          <a:p>
+            <a:r>
+              <a:rPr lang="en-US" altLang="ko-KR" dirty="0" smtClean="0"/>
+              <a:t>compound </a:t>
+            </a:r>
+            <a:r>
+              <a:rPr lang="en-US" altLang="ko-KR" dirty="0"/>
+              <a:t>neighboring links based on 2D structural similarity,</a:t>
+            </a:r>
+          </a:p>
+          <a:p>
+            <a:r>
+              <a:rPr lang="en-US" altLang="ko-KR" dirty="0"/>
+              <a:t>protein neighboring links, based on sequence similarity.</a:t>
+            </a:r>
+            <a:endParaRPr lang="ko-KR" altLang="en-US" dirty="0"/>
+          </a:p>
+        </p:txBody>
+      </p:sp>
+    </p:spTree>
+    <p:extLst>
+      <p:ext uri="{BB962C8B-B14F-4D97-AF65-F5344CB8AC3E}">
+        <p14:creationId xmlns:p14="http://schemas.microsoft.com/office/powerpoint/2010/main" val="3470862333"/>
+      </p:ext>
+    </p:extLst>
+  </p:cSld>
+  <p:clrMapOvr>
+    <a:masterClrMapping/>
+  </p:clrMapOvr>
+</p:sld>
+</file>
+
+<file path=ppt/slides/slide7.xml><?xml version="1.0" encoding="utf-8"?>
+<p:sld xmlns:a="http://schemas.openxmlformats.org/drawingml/2006/main" xmlns:r="http://schemas.openxmlformats.org/officeDocument/2006/relationships" xmlns:p="http://schemas.openxmlformats.org/presentationml/2006/main">
+  <p:cSld>
+    <p:spTree>
+      <p:nvGrpSpPr>
+        <p:cNvPr id="1" name=""/>
+        <p:cNvGrpSpPr/>
+        <p:nvPr/>
+      </p:nvGrpSpPr>
+      <p:grpSpPr>
+        <a:xfrm>
+          <a:off x="0" y="0"/>
+          <a:ext cx="0" cy="0"/>
+          <a:chOff x="0" y="0"/>
+          <a:chExt cx="0" cy="0"/>
+        </a:xfrm>
+      </p:grpSpPr>
+      <p:sp>
+        <p:nvSpPr>
+          <p:cNvPr id="2" name="제목 1"/>
+          <p:cNvSpPr>
+            <a:spLocks noGrp="1"/>
+          </p:cNvSpPr>
+          <p:nvPr>
+            <p:ph type="title"/>
+          </p:nvPr>
+        </p:nvSpPr>
+        <p:spPr/>
+        <p:txBody>
+          <a:bodyPr/>
+          <a:lstStyle/>
+          <a:p>
+            <a:r>
+              <a:rPr lang="en-US" altLang="ko-KR" dirty="0" smtClean="0"/>
+              <a:t>Semantic network</a:t>
+            </a:r>
+            <a:endParaRPr lang="ko-KR" altLang="en-US" dirty="0"/>
+          </a:p>
+        </p:txBody>
+      </p:sp>
+      <p:sp>
+        <p:nvSpPr>
+          <p:cNvPr id="3" name="내용 개체 틀 2"/>
+          <p:cNvSpPr>
+            <a:spLocks noGrp="1"/>
+          </p:cNvSpPr>
+          <p:nvPr>
+            <p:ph idx="1"/>
+          </p:nvPr>
+        </p:nvSpPr>
+        <p:spPr/>
+        <p:txBody>
+          <a:bodyPr>
+            <a:normAutofit/>
+          </a:bodyPr>
+          <a:lstStyle/>
+          <a:p>
+            <a:r>
+              <a:rPr lang="en-US" altLang="ko-KR" dirty="0" smtClean="0"/>
+              <a:t>In the Chem2Bio2RDF semantic network, there are 9 semantic types, 10 semantic links and 2 more similarity.</a:t>
+            </a:r>
+          </a:p>
+          <a:p>
+            <a:endParaRPr lang="en-US" altLang="ko-KR" dirty="0"/>
+          </a:p>
+          <a:p>
+            <a:r>
+              <a:rPr lang="en-US" altLang="ko-KR" dirty="0" smtClean="0"/>
+              <a:t>A total of twelve adjacency matrixes were computed based on the semantic links between any two objects.</a:t>
+            </a:r>
+          </a:p>
+          <a:p>
+            <a:endParaRPr lang="en-US" altLang="ko-KR" dirty="0"/>
+          </a:p>
+          <a:p>
+            <a:r>
+              <a:rPr lang="en-US" altLang="ko-KR" dirty="0" smtClean="0"/>
+              <a:t>The elements of the adjacency matrixes have to values.</a:t>
+            </a:r>
+            <a:endParaRPr lang="en-US" altLang="ko-KR" dirty="0"/>
+          </a:p>
+          <a:p>
+            <a:pPr lvl="1"/>
+            <a:r>
+              <a:rPr lang="en-US" altLang="ko-KR" dirty="0"/>
+              <a:t>0 : link is unobserved.</a:t>
+            </a:r>
+          </a:p>
+          <a:p>
+            <a:pPr lvl="1"/>
+            <a:r>
+              <a:rPr lang="en-US" altLang="ko-KR" dirty="0"/>
+              <a:t>1 : link is observed.</a:t>
+            </a:r>
+          </a:p>
+          <a:p>
+            <a:endParaRPr lang="en-US" altLang="ko-KR" dirty="0" smtClean="0"/>
+          </a:p>
+          <a:p>
+            <a:endParaRPr lang="en-US" altLang="ko-KR" dirty="0"/>
+          </a:p>
+        </p:txBody>
+      </p:sp>
+    </p:spTree>
+    <p:extLst>
+      <p:ext uri="{BB962C8B-B14F-4D97-AF65-F5344CB8AC3E}">
+        <p14:creationId xmlns:p14="http://schemas.microsoft.com/office/powerpoint/2010/main" val="3915065346"/>
+      </p:ext>
+    </p:extLst>
+  </p:cSld>
+  <p:clrMapOvr>
+    <a:masterClrMapping/>
+  </p:clrMapOvr>
+</p:sld>
+</file>
+
+<file path=ppt/slides/slide8.xml><?xml version="1.0" encoding="utf-8"?>
+<p:sld xmlns:a="http://schemas.openxmlformats.org/drawingml/2006/main" xmlns:r="http://schemas.openxmlformats.org/officeDocument/2006/relationships" xmlns:p="http://schemas.openxmlformats.org/presentationml/2006/main">
+  <p:cSld>
+    <p:spTree>
+      <p:nvGrpSpPr>
+        <p:cNvPr id="1" name=""/>
+        <p:cNvGrpSpPr/>
+        <p:nvPr/>
+      </p:nvGrpSpPr>
+      <p:grpSpPr>
+        <a:xfrm>
+          <a:off x="0" y="0"/>
+          <a:ext cx="0" cy="0"/>
+          <a:chOff x="0" y="0"/>
+          <a:chExt cx="0" cy="0"/>
+        </a:xfrm>
+      </p:grpSpPr>
+      <p:sp>
+        <p:nvSpPr>
+          <p:cNvPr id="2" name="제목 1"/>
+          <p:cNvSpPr>
+            <a:spLocks noGrp="1"/>
+          </p:cNvSpPr>
+          <p:nvPr>
+            <p:ph type="title"/>
+          </p:nvPr>
+        </p:nvSpPr>
+        <p:spPr/>
+        <p:txBody>
+          <a:bodyPr/>
+          <a:lstStyle/>
+          <a:p>
+            <a:r>
+              <a:rPr lang="en-US" altLang="ko-KR" dirty="0" smtClean="0"/>
+              <a:t>Semantic network</a:t>
+            </a:r>
+            <a:endParaRPr lang="ko-KR" altLang="en-US" dirty="0"/>
+          </a:p>
+        </p:txBody>
+      </p:sp>
+      <p:sp>
+        <p:nvSpPr>
+          <p:cNvPr id="3" name="내용 개체 틀 2"/>
+          <p:cNvSpPr>
+            <a:spLocks noGrp="1"/>
+          </p:cNvSpPr>
+          <p:nvPr>
+            <p:ph idx="1"/>
+          </p:nvPr>
+        </p:nvSpPr>
+        <p:spPr/>
+        <p:txBody>
+          <a:bodyPr>
+            <a:normAutofit/>
+          </a:bodyPr>
+          <a:lstStyle/>
+          <a:p>
+            <a:endParaRPr lang="en-US" altLang="ko-KR" dirty="0"/>
+          </a:p>
+        </p:txBody>
+      </p:sp>
+      <p:pic>
+        <p:nvPicPr>
+          <p:cNvPr id="1026" name="Picture 2" descr="C:\Users\MYCOM\Desktop\제목 없음.png"/>
+          <p:cNvPicPr>
+            <a:picLocks noChangeAspect="1" noChangeArrowheads="1"/>
+          </p:cNvPicPr>
+          <p:nvPr/>
+        </p:nvPicPr>
+        <p:blipFill>
+          <a:blip r:embed="rId2">
+            <a:extLst>
+              <a:ext uri="{28A0092B-C50C-407E-A947-70E740481C1C}">
+                <a14:useLocalDpi xmlns:a14="http://schemas.microsoft.com/office/drawing/2010/main" val="0"/>
+              </a:ext>
+            </a:extLst>
+          </a:blip>
+          <a:srcRect/>
+          <a:stretch>
+            <a:fillRect/>
+          </a:stretch>
+        </p:blipFill>
+        <p:spPr bwMode="auto">
+          <a:xfrm>
+            <a:off x="622676" y="1644649"/>
+            <a:ext cx="10978773" cy="4699001"/>
+          </a:xfrm>
+          <a:prstGeom prst="rect">
+            <a:avLst/>
+          </a:prstGeom>
+          <a:noFill/>
+          <a:extLst>
+            <a:ext uri="{909E8E84-426E-40DD-AFC4-6F175D3DCCD1}">
+              <a14:hiddenFill xmlns:a14="http://schemas.microsoft.com/office/drawing/2010/main">
+                <a:solidFill>
+                  <a:srgbClr val="FFFFFF"/>
+                </a:solidFill>
+              </a14:hiddenFill>
+            </a:ext>
+          </a:extLst>
+        </p:spPr>
+      </p:pic>
+    </p:spTree>
+    <p:extLst>
+      <p:ext uri="{BB962C8B-B14F-4D97-AF65-F5344CB8AC3E}">
+        <p14:creationId xmlns:p14="http://schemas.microsoft.com/office/powerpoint/2010/main" val="1786065519"/>
+      </p:ext>
+    </p:extLst>
+  </p:cSld>
+  <p:clrMapOvr>
+    <a:masterClrMapping/>
+  </p:clrMapOvr>
+  <p:timing>
+    <p:tnLst>
+      <p:par>
+        <p:cTn id="1" dur="indefinite" restart="never" nodeType="tmRoot"/>
+      </p:par>
+    </p:tnLst>
+  </p:timing>
+</p:sld>
+</file>
+
+<file path=ppt/slides/slide9.xml><?xml version="1.0" encoding="utf-8"?>
+<p:sld xmlns:a="http://schemas.openxmlformats.org/drawingml/2006/main" xmlns:r="http://schemas.openxmlformats.org/officeDocument/2006/relationships" xmlns:p="http://schemas.openxmlformats.org/presentationml/2006/main">
+  <p:cSld>
+    <p:spTree>
+      <p:nvGrpSpPr>
+        <p:cNvPr id="1" name=""/>
+        <p:cNvGrpSpPr/>
+        <p:nvPr/>
+      </p:nvGrpSpPr>
+      <p:grpSpPr>
+        <a:xfrm>
+          <a:off x="0" y="0"/>
+          <a:ext cx="0" cy="0"/>
+          <a:chOff x="0" y="0"/>
+          <a:chExt cx="0" cy="0"/>
+        </a:xfrm>
+      </p:grpSpPr>
+      <p:sp>
+        <p:nvSpPr>
+          <p:cNvPr id="2" name="제목 1"/>
+          <p:cNvSpPr>
+            <a:spLocks noGrp="1"/>
+          </p:cNvSpPr>
+          <p:nvPr>
+            <p:ph type="title"/>
+          </p:nvPr>
+        </p:nvSpPr>
+        <p:spPr/>
+        <p:txBody>
+          <a:bodyPr/>
+          <a:lstStyle/>
+          <a:p>
+            <a:r>
+              <a:rPr lang="en-US" altLang="ko-KR" dirty="0" smtClean="0"/>
+              <a:t>Meta-path-based topological features</a:t>
+            </a:r>
+            <a:endParaRPr lang="ko-KR" altLang="en-US" dirty="0"/>
+          </a:p>
+        </p:txBody>
+      </p:sp>
+      <p:sp>
+        <p:nvSpPr>
+          <p:cNvPr id="3" name="내용 개체 틀 2"/>
+          <p:cNvSpPr>
+            <a:spLocks noGrp="1"/>
+          </p:cNvSpPr>
+          <p:nvPr>
+            <p:ph idx="1"/>
+          </p:nvPr>
+        </p:nvSpPr>
+        <p:spPr/>
+        <p:txBody>
+          <a:bodyPr>
+            <a:normAutofit fontScale="62500" lnSpcReduction="20000"/>
+          </a:bodyPr>
+          <a:lstStyle/>
+          <a:p>
+            <a:r>
+              <a:rPr lang="en-US" altLang="ko-KR" dirty="0" smtClean="0"/>
+              <a:t>The meta-path topological features</a:t>
+            </a:r>
+            <a:r>
+              <a:rPr lang="ko-KR" altLang="en-US" dirty="0"/>
+              <a:t> </a:t>
+            </a:r>
+            <a:r>
+              <a:rPr lang="en-US" altLang="ko-KR" dirty="0" smtClean="0"/>
+              <a:t>were encoded in commuting matrixes, calculated by multiplying several adjacency matrixes.</a:t>
+            </a:r>
+          </a:p>
+          <a:p>
+            <a:endParaRPr lang="en-US" altLang="ko-KR" dirty="0"/>
+          </a:p>
+          <a:p>
+            <a:r>
+              <a:rPr lang="en-US" altLang="ko-KR" dirty="0" smtClean="0"/>
+              <a:t>The length of the meta paths equals the number of multiplied adjacency matrixes.</a:t>
+            </a:r>
+          </a:p>
+          <a:p>
+            <a:pPr lvl="1"/>
+            <a:r>
+              <a:rPr lang="en-US" altLang="ko-KR" dirty="0" smtClean="0"/>
+              <a:t>4 meta-paths are of length 2</a:t>
+            </a:r>
+          </a:p>
+          <a:p>
+            <a:pPr lvl="1"/>
+            <a:r>
+              <a:rPr lang="en-US" altLang="ko-KR" dirty="0" smtClean="0"/>
+              <a:t>11 meta-paths are of length 3</a:t>
+            </a:r>
+          </a:p>
+          <a:p>
+            <a:pPr lvl="1"/>
+            <a:r>
+              <a:rPr lang="en-US" altLang="ko-KR" dirty="0" smtClean="0"/>
+              <a:t>36 meta-paths are of length 4</a:t>
+            </a:r>
+          </a:p>
+          <a:p>
+            <a:pPr lvl="1"/>
+            <a:r>
+              <a:rPr lang="en-US" altLang="ko-KR" dirty="0" smtClean="0"/>
+              <a:t>Excepted greater than length 4.</a:t>
+            </a:r>
+          </a:p>
+          <a:p>
+            <a:pPr lvl="1"/>
+            <a:endParaRPr lang="en-US" altLang="ko-KR" dirty="0" smtClean="0"/>
+          </a:p>
+          <a:p>
+            <a:r>
+              <a:rPr lang="en-US" altLang="ko-KR" dirty="0" smtClean="0"/>
+              <a:t>The elements in the commuting matrix indicate the number of path instances linking compounds to proteins.</a:t>
+            </a:r>
+          </a:p>
+          <a:p>
+            <a:endParaRPr lang="en-US" altLang="ko-KR" dirty="0"/>
+          </a:p>
+          <a:p>
+            <a:r>
+              <a:rPr lang="en-US" altLang="ko-KR" dirty="0" smtClean="0"/>
+              <a:t>No negative integer values.</a:t>
+            </a:r>
+          </a:p>
+          <a:p>
+            <a:endParaRPr lang="en-US" altLang="ko-KR" dirty="0"/>
+          </a:p>
+          <a:p>
+            <a:r>
+              <a:rPr lang="en-US" altLang="ko-KR" dirty="0" smtClean="0"/>
+              <a:t>All calculation performed by Armadillo C++ linear algebra library, and matrixes were encoded as sparse for reducing memory consumption.</a:t>
+            </a:r>
+          </a:p>
+          <a:p>
+            <a:pPr marL="0" indent="0">
+              <a:buNone/>
+            </a:pPr>
+            <a:endParaRPr lang="en-US" altLang="ko-KR" dirty="0" smtClean="0"/>
+          </a:p>
+          <a:p>
+            <a:endParaRPr lang="en-US" altLang="ko-KR" dirty="0" smtClean="0"/>
+          </a:p>
+        </p:txBody>
+      </p:sp>
+    </p:spTree>
+    <p:extLst>
+      <p:ext uri="{BB962C8B-B14F-4D97-AF65-F5344CB8AC3E}">
+        <p14:creationId xmlns:p14="http://schemas.microsoft.com/office/powerpoint/2010/main" val="2900081589"/>
+      </p:ext>
+    </p:extLst>
+  </p:cSld>
+  <p:clrMapOvr>
+    <a:masterClrMapping/>
+  </p:clrMapOvr>
+  <p:timing>
+    <p:tnLst>
+      <p:par>
+        <p:cTn id="1" dur="indefinite" restart="never" nodeType="tmRoot"/>
+      </p:par>
+    </p:tnLst>
+  </p:timing>
 </p:sld>
 </file>
 
@@ -3077,7 +6604,7 @@
     </a:clrScheme>
     <a:fontScheme name="Office">
       <a:majorFont>
-        <a:latin typeface="맑은 고딕" panose="020F0302020204030204"/>
+        <a:latin typeface="맑은 고딕"/>
         <a:ea typeface=""/>
         <a:cs typeface=""/>
         <a:font script="Jpan" typeface="ＭＳ Ｐゴシック"/>
@@ -3112,7 +6639,7 @@
         <a:font script="Geor" typeface="Sylfaen"/>
       </a:majorFont>
       <a:minorFont>
-        <a:latin typeface="맑은 고딕" panose="020F0502020204030204"/>
+        <a:latin typeface="맑은 고딕"/>
         <a:ea typeface=""/>
         <a:cs typeface=""/>
         <a:font script="Jpan" typeface="ＭＳ Ｐゴシック"/>
@@ -3289,7 +6816,7 @@
   <a:extraClrSchemeLst/>
   <a:extLst>
     <a:ext uri="{05A4C25C-085E-4340-85A3-A5531E510DB2}">
-      <thm15:themeFamily xmlns:thm15="http://schemas.microsoft.com/office/thememl/2012/main" name="Office Theme" id="{62F939B6-93AF-4DB8-9C6B-D6C7DFDC589F}" vid="{4A3C46E8-61CC-4603-A589-7422A47A8E4A}"/>
+      <thm15:themeFamily xmlns:thm15="http://schemas.microsoft.com/office/thememl/2012/main" xmlns="" name="Office Theme" id="{62F939B6-93AF-4DB8-9C6B-D6C7DFDC589F}" vid="{4A3C46E8-61CC-4603-A589-7422A47A8E4A}"/>
     </a:ext>
   </a:extLst>
 </a:theme>

</xml_diff>